<commit_message>
upload new description files
</commit_message>
<xml_diff>
--- a/8bit_design/CPU.pptx
+++ b/8bit_design/CPU.pptx
@@ -7,6 +7,8 @@
   <p:sldIdLst>
     <p:sldId id="256" r:id="rId2"/>
     <p:sldId id="257" r:id="rId3"/>
+    <p:sldId id="258" r:id="rId4"/>
+    <p:sldId id="260" r:id="rId5"/>
   </p:sldIdLst>
   <p:sldSz cx="12192000" cy="6858000"/>
   <p:notesSz cx="6858000" cy="9144000"/>
@@ -260,7 +262,7 @@
           <a:p>
             <a:fld id="{3DA55360-DDDC-4346-A6FA-426842ECECBE}" type="datetimeFigureOut">
               <a:rPr kumimoji="1" lang="zh-CN" altLang="en-US" smtClean="0"/>
-              <a:t>2024/1/27</a:t>
+              <a:t>2024/2/3</a:t>
             </a:fld>
             <a:endParaRPr kumimoji="1" lang="zh-CN" altLang="en-US"/>
           </a:p>
@@ -458,7 +460,7 @@
           <a:p>
             <a:fld id="{3DA55360-DDDC-4346-A6FA-426842ECECBE}" type="datetimeFigureOut">
               <a:rPr kumimoji="1" lang="zh-CN" altLang="en-US" smtClean="0"/>
-              <a:t>2024/1/27</a:t>
+              <a:t>2024/2/3</a:t>
             </a:fld>
             <a:endParaRPr kumimoji="1" lang="zh-CN" altLang="en-US"/>
           </a:p>
@@ -666,7 +668,7 @@
           <a:p>
             <a:fld id="{3DA55360-DDDC-4346-A6FA-426842ECECBE}" type="datetimeFigureOut">
               <a:rPr kumimoji="1" lang="zh-CN" altLang="en-US" smtClean="0"/>
-              <a:t>2024/1/27</a:t>
+              <a:t>2024/2/3</a:t>
             </a:fld>
             <a:endParaRPr kumimoji="1" lang="zh-CN" altLang="en-US"/>
           </a:p>
@@ -864,7 +866,7 @@
           <a:p>
             <a:fld id="{3DA55360-DDDC-4346-A6FA-426842ECECBE}" type="datetimeFigureOut">
               <a:rPr kumimoji="1" lang="zh-CN" altLang="en-US" smtClean="0"/>
-              <a:t>2024/1/27</a:t>
+              <a:t>2024/2/3</a:t>
             </a:fld>
             <a:endParaRPr kumimoji="1" lang="zh-CN" altLang="en-US"/>
           </a:p>
@@ -1139,7 +1141,7 @@
           <a:p>
             <a:fld id="{3DA55360-DDDC-4346-A6FA-426842ECECBE}" type="datetimeFigureOut">
               <a:rPr kumimoji="1" lang="zh-CN" altLang="en-US" smtClean="0"/>
-              <a:t>2024/1/27</a:t>
+              <a:t>2024/2/3</a:t>
             </a:fld>
             <a:endParaRPr kumimoji="1" lang="zh-CN" altLang="en-US"/>
           </a:p>
@@ -1404,7 +1406,7 @@
           <a:p>
             <a:fld id="{3DA55360-DDDC-4346-A6FA-426842ECECBE}" type="datetimeFigureOut">
               <a:rPr kumimoji="1" lang="zh-CN" altLang="en-US" smtClean="0"/>
-              <a:t>2024/1/27</a:t>
+              <a:t>2024/2/3</a:t>
             </a:fld>
             <a:endParaRPr kumimoji="1" lang="zh-CN" altLang="en-US"/>
           </a:p>
@@ -1816,7 +1818,7 @@
           <a:p>
             <a:fld id="{3DA55360-DDDC-4346-A6FA-426842ECECBE}" type="datetimeFigureOut">
               <a:rPr kumimoji="1" lang="zh-CN" altLang="en-US" smtClean="0"/>
-              <a:t>2024/1/27</a:t>
+              <a:t>2024/2/3</a:t>
             </a:fld>
             <a:endParaRPr kumimoji="1" lang="zh-CN" altLang="en-US"/>
           </a:p>
@@ -1957,7 +1959,7 @@
           <a:p>
             <a:fld id="{3DA55360-DDDC-4346-A6FA-426842ECECBE}" type="datetimeFigureOut">
               <a:rPr kumimoji="1" lang="zh-CN" altLang="en-US" smtClean="0"/>
-              <a:t>2024/1/27</a:t>
+              <a:t>2024/2/3</a:t>
             </a:fld>
             <a:endParaRPr kumimoji="1" lang="zh-CN" altLang="en-US"/>
           </a:p>
@@ -2070,7 +2072,7 @@
           <a:p>
             <a:fld id="{3DA55360-DDDC-4346-A6FA-426842ECECBE}" type="datetimeFigureOut">
               <a:rPr kumimoji="1" lang="zh-CN" altLang="en-US" smtClean="0"/>
-              <a:t>2024/1/27</a:t>
+              <a:t>2024/2/3</a:t>
             </a:fld>
             <a:endParaRPr kumimoji="1" lang="zh-CN" altLang="en-US"/>
           </a:p>
@@ -2381,7 +2383,7 @@
           <a:p>
             <a:fld id="{3DA55360-DDDC-4346-A6FA-426842ECECBE}" type="datetimeFigureOut">
               <a:rPr kumimoji="1" lang="zh-CN" altLang="en-US" smtClean="0"/>
-              <a:t>2024/1/27</a:t>
+              <a:t>2024/2/3</a:t>
             </a:fld>
             <a:endParaRPr kumimoji="1" lang="zh-CN" altLang="en-US"/>
           </a:p>
@@ -2669,7 +2671,7 @@
           <a:p>
             <a:fld id="{3DA55360-DDDC-4346-A6FA-426842ECECBE}" type="datetimeFigureOut">
               <a:rPr kumimoji="1" lang="zh-CN" altLang="en-US" smtClean="0"/>
-              <a:t>2024/1/27</a:t>
+              <a:t>2024/2/3</a:t>
             </a:fld>
             <a:endParaRPr kumimoji="1" lang="zh-CN" altLang="en-US"/>
           </a:p>
@@ -2910,7 +2912,7 @@
           <a:p>
             <a:fld id="{3DA55360-DDDC-4346-A6FA-426842ECECBE}" type="datetimeFigureOut">
               <a:rPr kumimoji="1" lang="zh-CN" altLang="en-US" smtClean="0"/>
-              <a:t>2024/1/27</a:t>
+              <a:t>2024/2/3</a:t>
             </a:fld>
             <a:endParaRPr kumimoji="1" lang="zh-CN" altLang="en-US"/>
           </a:p>
@@ -7972,10 +7974,3483 @@
           </a:p>
         </p:txBody>
       </p:sp>
+      <p:sp>
+        <p:nvSpPr>
+          <p:cNvPr id="18" name="TextBox 17">
+            <a:extLst>
+              <a:ext uri="{FF2B5EF4-FFF2-40B4-BE49-F238E27FC236}">
+                <a16:creationId xmlns:a16="http://schemas.microsoft.com/office/drawing/2014/main" id="{ECF70C42-CA3F-609E-7CF2-F93AB0DE04BB}"/>
+              </a:ext>
+            </a:extLst>
+          </p:cNvPr>
+          <p:cNvSpPr txBox="1"/>
+          <p:nvPr/>
+        </p:nvSpPr>
+        <p:spPr>
+          <a:xfrm>
+            <a:off x="2841456" y="4210850"/>
+            <a:ext cx="2031325" cy="369332"/>
+          </a:xfrm>
+          <a:prstGeom prst="rect">
+            <a:avLst/>
+          </a:prstGeom>
+          <a:noFill/>
+        </p:spPr>
+        <p:txBody>
+          <a:bodyPr wrap="none" rtlCol="0">
+            <a:spAutoFit/>
+          </a:bodyPr>
+          <a:lstStyle/>
+          <a:p>
+            <a:r>
+              <a:rPr lang="en-CN" dirty="0"/>
+              <a:t>原方案</a:t>
+            </a:r>
+            <a:r>
+              <a:rPr lang="zh-CN" altLang="en-US" dirty="0"/>
+              <a:t>（未使用）</a:t>
+            </a:r>
+            <a:endParaRPr lang="en-CN" dirty="0"/>
+          </a:p>
+        </p:txBody>
+      </p:sp>
     </p:spTree>
     <p:extLst>
       <p:ext uri="{BB962C8B-B14F-4D97-AF65-F5344CB8AC3E}">
         <p14:creationId xmlns:p14="http://schemas.microsoft.com/office/powerpoint/2010/main" val="3302031342"/>
+      </p:ext>
+    </p:extLst>
+  </p:cSld>
+  <p:clrMapOvr>
+    <a:masterClrMapping/>
+  </p:clrMapOvr>
+</p:sld>
+</file>
+
+<file path=ppt/slides/slide3.xml><?xml version="1.0" encoding="utf-8"?>
+<p:sld xmlns:a="http://schemas.openxmlformats.org/drawingml/2006/main" xmlns:r="http://schemas.openxmlformats.org/officeDocument/2006/relationships" xmlns:p="http://schemas.openxmlformats.org/presentationml/2006/main">
+  <p:cSld>
+    <p:spTree>
+      <p:nvGrpSpPr>
+        <p:cNvPr id="1" name="">
+          <a:extLst>
+            <a:ext uri="{FF2B5EF4-FFF2-40B4-BE49-F238E27FC236}">
+              <a16:creationId xmlns:a16="http://schemas.microsoft.com/office/drawing/2014/main" id="{2C3AFB3C-04D4-9CAF-F5DE-C66D78F75C22}"/>
+            </a:ext>
+          </a:extLst>
+        </p:cNvPr>
+        <p:cNvGrpSpPr/>
+        <p:nvPr/>
+      </p:nvGrpSpPr>
+      <p:grpSpPr>
+        <a:xfrm>
+          <a:off x="0" y="0"/>
+          <a:ext cx="0" cy="0"/>
+          <a:chOff x="0" y="0"/>
+          <a:chExt cx="0" cy="0"/>
+        </a:xfrm>
+      </p:grpSpPr>
+      <p:sp>
+        <p:nvSpPr>
+          <p:cNvPr id="4" name="半闭框 3">
+            <a:extLst>
+              <a:ext uri="{FF2B5EF4-FFF2-40B4-BE49-F238E27FC236}">
+                <a16:creationId xmlns:a16="http://schemas.microsoft.com/office/drawing/2014/main" id="{4125BC87-769A-9D93-3B7F-CCEA8016EC21}"/>
+              </a:ext>
+            </a:extLst>
+          </p:cNvPr>
+          <p:cNvSpPr/>
+          <p:nvPr/>
+        </p:nvSpPr>
+        <p:spPr>
+          <a:xfrm rot="8100000">
+            <a:off x="7587730" y="2372807"/>
+            <a:ext cx="1368656" cy="1368656"/>
+          </a:xfrm>
+          <a:prstGeom prst="halfFrame">
+            <a:avLst>
+              <a:gd name="adj1" fmla="val 36223"/>
+              <a:gd name="adj2" fmla="val 35637"/>
+            </a:avLst>
+          </a:prstGeom>
+        </p:spPr>
+        <p:style>
+          <a:lnRef idx="2">
+            <a:schemeClr val="accent3">
+              <a:shade val="15000"/>
+            </a:schemeClr>
+          </a:lnRef>
+          <a:fillRef idx="1">
+            <a:schemeClr val="accent3"/>
+          </a:fillRef>
+          <a:effectRef idx="0">
+            <a:schemeClr val="accent3"/>
+          </a:effectRef>
+          <a:fontRef idx="minor">
+            <a:schemeClr val="lt1"/>
+          </a:fontRef>
+        </p:style>
+        <p:txBody>
+          <a:bodyPr rtlCol="0" anchor="ctr"/>
+          <a:lstStyle/>
+          <a:p>
+            <a:pPr algn="ctr"/>
+            <a:endParaRPr kumimoji="1" lang="zh-CN" altLang="en-US" sz="1600" dirty="0">
+              <a:solidFill>
+                <a:schemeClr val="tx1"/>
+              </a:solidFill>
+            </a:endParaRPr>
+          </a:p>
+        </p:txBody>
+      </p:sp>
+      <p:sp>
+        <p:nvSpPr>
+          <p:cNvPr id="6" name="圆角矩形 5">
+            <a:extLst>
+              <a:ext uri="{FF2B5EF4-FFF2-40B4-BE49-F238E27FC236}">
+                <a16:creationId xmlns:a16="http://schemas.microsoft.com/office/drawing/2014/main" id="{F738E408-AA51-D4EB-1C2A-F330B9307E92}"/>
+              </a:ext>
+            </a:extLst>
+          </p:cNvPr>
+          <p:cNvSpPr/>
+          <p:nvPr/>
+        </p:nvSpPr>
+        <p:spPr>
+          <a:xfrm>
+            <a:off x="251086" y="1252342"/>
+            <a:ext cx="859768" cy="545759"/>
+          </a:xfrm>
+          <a:prstGeom prst="roundRect">
+            <a:avLst/>
+          </a:prstGeom>
+          <a:solidFill>
+            <a:schemeClr val="accent1">
+              <a:lumMod val="50000"/>
+            </a:schemeClr>
+          </a:solidFill>
+        </p:spPr>
+        <p:style>
+          <a:lnRef idx="2">
+            <a:schemeClr val="accent5">
+              <a:shade val="15000"/>
+            </a:schemeClr>
+          </a:lnRef>
+          <a:fillRef idx="1">
+            <a:schemeClr val="accent5"/>
+          </a:fillRef>
+          <a:effectRef idx="0">
+            <a:schemeClr val="accent5"/>
+          </a:effectRef>
+          <a:fontRef idx="minor">
+            <a:schemeClr val="lt1"/>
+          </a:fontRef>
+        </p:style>
+        <p:txBody>
+          <a:bodyPr rtlCol="0" anchor="ctr"/>
+          <a:lstStyle/>
+          <a:p>
+            <a:pPr algn="ctr"/>
+            <a:r>
+              <a:rPr kumimoji="1" lang="en-US" altLang="zh-CN" sz="1400" dirty="0"/>
+              <a:t>PC</a:t>
+            </a:r>
+          </a:p>
+          <a:p>
+            <a:pPr algn="ctr"/>
+            <a:r>
+              <a:rPr kumimoji="1" lang="en-US" altLang="zh-CN" sz="1400" dirty="0"/>
+              <a:t>Register</a:t>
+            </a:r>
+            <a:endParaRPr kumimoji="1" lang="zh-CN" altLang="en-US" sz="1400" dirty="0"/>
+          </a:p>
+        </p:txBody>
+      </p:sp>
+      <p:sp>
+        <p:nvSpPr>
+          <p:cNvPr id="7" name="圆角矩形 6">
+            <a:extLst>
+              <a:ext uri="{FF2B5EF4-FFF2-40B4-BE49-F238E27FC236}">
+                <a16:creationId xmlns:a16="http://schemas.microsoft.com/office/drawing/2014/main" id="{2C2CE2D5-D9D6-B8F1-ED60-C0567FE7E554}"/>
+              </a:ext>
+            </a:extLst>
+          </p:cNvPr>
+          <p:cNvSpPr/>
+          <p:nvPr/>
+        </p:nvSpPr>
+        <p:spPr>
+          <a:xfrm>
+            <a:off x="1516055" y="422644"/>
+            <a:ext cx="1202250" cy="1494903"/>
+          </a:xfrm>
+          <a:prstGeom prst="roundRect">
+            <a:avLst/>
+          </a:prstGeom>
+        </p:spPr>
+        <p:style>
+          <a:lnRef idx="1">
+            <a:schemeClr val="accent4"/>
+          </a:lnRef>
+          <a:fillRef idx="2">
+            <a:schemeClr val="accent4"/>
+          </a:fillRef>
+          <a:effectRef idx="1">
+            <a:schemeClr val="accent4"/>
+          </a:effectRef>
+          <a:fontRef idx="minor">
+            <a:schemeClr val="dk1"/>
+          </a:fontRef>
+        </p:style>
+        <p:txBody>
+          <a:bodyPr rtlCol="0" anchor="ctr"/>
+          <a:lstStyle/>
+          <a:p>
+            <a:pPr algn="ctr"/>
+            <a:r>
+              <a:rPr kumimoji="1" lang="en-US" altLang="zh-CN" sz="1600" dirty="0"/>
+              <a:t>ROM</a:t>
+            </a:r>
+            <a:endParaRPr kumimoji="1" lang="zh-CN" altLang="en-US" sz="1600" dirty="0"/>
+          </a:p>
+        </p:txBody>
+      </p:sp>
+      <p:sp>
+        <p:nvSpPr>
+          <p:cNvPr id="8" name="圆角矩形 7">
+            <a:extLst>
+              <a:ext uri="{FF2B5EF4-FFF2-40B4-BE49-F238E27FC236}">
+                <a16:creationId xmlns:a16="http://schemas.microsoft.com/office/drawing/2014/main" id="{826455C0-ACDB-68AB-EB87-F5C945848110}"/>
+              </a:ext>
+            </a:extLst>
+          </p:cNvPr>
+          <p:cNvSpPr/>
+          <p:nvPr/>
+        </p:nvSpPr>
+        <p:spPr>
+          <a:xfrm>
+            <a:off x="3450313" y="342745"/>
+            <a:ext cx="1099426" cy="727678"/>
+          </a:xfrm>
+          <a:prstGeom prst="roundRect">
+            <a:avLst/>
+          </a:prstGeom>
+          <a:solidFill>
+            <a:schemeClr val="accent1">
+              <a:lumMod val="75000"/>
+            </a:schemeClr>
+          </a:solidFill>
+        </p:spPr>
+        <p:style>
+          <a:lnRef idx="2">
+            <a:schemeClr val="accent5">
+              <a:shade val="15000"/>
+            </a:schemeClr>
+          </a:lnRef>
+          <a:fillRef idx="1">
+            <a:schemeClr val="accent5"/>
+          </a:fillRef>
+          <a:effectRef idx="0">
+            <a:schemeClr val="accent5"/>
+          </a:effectRef>
+          <a:fontRef idx="minor">
+            <a:schemeClr val="lt1"/>
+          </a:fontRef>
+        </p:style>
+        <p:txBody>
+          <a:bodyPr rtlCol="0" anchor="ctr"/>
+          <a:lstStyle/>
+          <a:p>
+            <a:pPr algn="ctr"/>
+            <a:r>
+              <a:rPr kumimoji="1" lang="en-US" altLang="zh-CN" sz="1400" dirty="0"/>
+              <a:t>Instruction</a:t>
+            </a:r>
+          </a:p>
+          <a:p>
+            <a:pPr algn="ctr"/>
+            <a:r>
+              <a:rPr kumimoji="1" lang="en-US" altLang="zh-CN" sz="1400" dirty="0"/>
+              <a:t>Register</a:t>
+            </a:r>
+            <a:endParaRPr kumimoji="1" lang="zh-CN" altLang="en-US" sz="1400" dirty="0"/>
+          </a:p>
+        </p:txBody>
+      </p:sp>
+      <p:sp>
+        <p:nvSpPr>
+          <p:cNvPr id="9" name="圆角矩形 8">
+            <a:extLst>
+              <a:ext uri="{FF2B5EF4-FFF2-40B4-BE49-F238E27FC236}">
+                <a16:creationId xmlns:a16="http://schemas.microsoft.com/office/drawing/2014/main" id="{360FF5D9-6CBC-5D13-804C-4521D35F2193}"/>
+              </a:ext>
+            </a:extLst>
+          </p:cNvPr>
+          <p:cNvSpPr/>
+          <p:nvPr/>
+        </p:nvSpPr>
+        <p:spPr>
+          <a:xfrm>
+            <a:off x="5912828" y="1976385"/>
+            <a:ext cx="1110500" cy="506211"/>
+          </a:xfrm>
+          <a:prstGeom prst="roundRect">
+            <a:avLst/>
+          </a:prstGeom>
+        </p:spPr>
+        <p:style>
+          <a:lnRef idx="1">
+            <a:schemeClr val="accent4"/>
+          </a:lnRef>
+          <a:fillRef idx="2">
+            <a:schemeClr val="accent4"/>
+          </a:fillRef>
+          <a:effectRef idx="1">
+            <a:schemeClr val="accent4"/>
+          </a:effectRef>
+          <a:fontRef idx="minor">
+            <a:schemeClr val="dk1"/>
+          </a:fontRef>
+        </p:style>
+        <p:txBody>
+          <a:bodyPr rtlCol="0" anchor="ctr"/>
+          <a:lstStyle/>
+          <a:p>
+            <a:pPr algn="ctr"/>
+            <a:r>
+              <a:rPr kumimoji="1" lang="en-US" altLang="zh-CN" sz="1600" dirty="0"/>
+              <a:t>A Register</a:t>
+            </a:r>
+            <a:endParaRPr kumimoji="1" lang="zh-CN" altLang="en-US" sz="1600" dirty="0"/>
+          </a:p>
+        </p:txBody>
+      </p:sp>
+      <p:sp>
+        <p:nvSpPr>
+          <p:cNvPr id="10" name="圆角矩形 9">
+            <a:extLst>
+              <a:ext uri="{FF2B5EF4-FFF2-40B4-BE49-F238E27FC236}">
+                <a16:creationId xmlns:a16="http://schemas.microsoft.com/office/drawing/2014/main" id="{FB12AB1E-DEF0-3106-941F-7518293D41BA}"/>
+              </a:ext>
+            </a:extLst>
+          </p:cNvPr>
+          <p:cNvSpPr/>
+          <p:nvPr/>
+        </p:nvSpPr>
+        <p:spPr>
+          <a:xfrm>
+            <a:off x="5912828" y="2663682"/>
+            <a:ext cx="1110500" cy="506211"/>
+          </a:xfrm>
+          <a:prstGeom prst="roundRect">
+            <a:avLst/>
+          </a:prstGeom>
+        </p:spPr>
+        <p:style>
+          <a:lnRef idx="1">
+            <a:schemeClr val="accent4"/>
+          </a:lnRef>
+          <a:fillRef idx="2">
+            <a:schemeClr val="accent4"/>
+          </a:fillRef>
+          <a:effectRef idx="1">
+            <a:schemeClr val="accent4"/>
+          </a:effectRef>
+          <a:fontRef idx="minor">
+            <a:schemeClr val="dk1"/>
+          </a:fontRef>
+        </p:style>
+        <p:txBody>
+          <a:bodyPr rtlCol="0" anchor="ctr"/>
+          <a:lstStyle/>
+          <a:p>
+            <a:pPr algn="ctr"/>
+            <a:r>
+              <a:rPr kumimoji="1" lang="en-US" altLang="zh-CN" sz="1600" dirty="0"/>
+              <a:t>B Register</a:t>
+            </a:r>
+            <a:endParaRPr kumimoji="1" lang="zh-CN" altLang="en-US" sz="1600" dirty="0"/>
+          </a:p>
+        </p:txBody>
+      </p:sp>
+      <p:sp>
+        <p:nvSpPr>
+          <p:cNvPr id="12" name="圆角矩形 11">
+            <a:extLst>
+              <a:ext uri="{FF2B5EF4-FFF2-40B4-BE49-F238E27FC236}">
+                <a16:creationId xmlns:a16="http://schemas.microsoft.com/office/drawing/2014/main" id="{19D17A43-C5B5-745E-0448-629CF095A484}"/>
+              </a:ext>
+            </a:extLst>
+          </p:cNvPr>
+          <p:cNvSpPr/>
+          <p:nvPr/>
+        </p:nvSpPr>
+        <p:spPr>
+          <a:xfrm>
+            <a:off x="5912356" y="3532064"/>
+            <a:ext cx="1110366" cy="1388912"/>
+          </a:xfrm>
+          <a:prstGeom prst="roundRect">
+            <a:avLst/>
+          </a:prstGeom>
+        </p:spPr>
+        <p:style>
+          <a:lnRef idx="1">
+            <a:schemeClr val="accent4"/>
+          </a:lnRef>
+          <a:fillRef idx="2">
+            <a:schemeClr val="accent4"/>
+          </a:fillRef>
+          <a:effectRef idx="1">
+            <a:schemeClr val="accent4"/>
+          </a:effectRef>
+          <a:fontRef idx="minor">
+            <a:schemeClr val="dk1"/>
+          </a:fontRef>
+        </p:style>
+        <p:txBody>
+          <a:bodyPr rtlCol="0" anchor="ctr"/>
+          <a:lstStyle/>
+          <a:p>
+            <a:pPr algn="ctr"/>
+            <a:r>
+              <a:rPr kumimoji="1" lang="en-US" altLang="zh-CN" sz="1600" dirty="0"/>
+              <a:t>RAM</a:t>
+            </a:r>
+            <a:endParaRPr kumimoji="1" lang="zh-CN" altLang="en-US" sz="1600" dirty="0"/>
+          </a:p>
+        </p:txBody>
+      </p:sp>
+      <p:sp>
+        <p:nvSpPr>
+          <p:cNvPr id="13" name="圆角矩形 12">
+            <a:extLst>
+              <a:ext uri="{FF2B5EF4-FFF2-40B4-BE49-F238E27FC236}">
+                <a16:creationId xmlns:a16="http://schemas.microsoft.com/office/drawing/2014/main" id="{6EE53DEE-72A2-9B68-A74F-9A7451E0F309}"/>
+              </a:ext>
+            </a:extLst>
+          </p:cNvPr>
+          <p:cNvSpPr/>
+          <p:nvPr/>
+        </p:nvSpPr>
+        <p:spPr>
+          <a:xfrm>
+            <a:off x="10112762" y="1184100"/>
+            <a:ext cx="2013490" cy="727678"/>
+          </a:xfrm>
+          <a:prstGeom prst="roundRect">
+            <a:avLst/>
+          </a:prstGeom>
+          <a:solidFill>
+            <a:schemeClr val="accent1">
+              <a:lumMod val="60000"/>
+              <a:lumOff val="40000"/>
+            </a:schemeClr>
+          </a:solidFill>
+        </p:spPr>
+        <p:style>
+          <a:lnRef idx="2">
+            <a:schemeClr val="accent1">
+              <a:shade val="15000"/>
+            </a:schemeClr>
+          </a:lnRef>
+          <a:fillRef idx="1">
+            <a:schemeClr val="accent1"/>
+          </a:fillRef>
+          <a:effectRef idx="0">
+            <a:schemeClr val="accent1"/>
+          </a:effectRef>
+          <a:fontRef idx="minor">
+            <a:schemeClr val="lt1"/>
+          </a:fontRef>
+        </p:style>
+        <p:txBody>
+          <a:bodyPr rtlCol="0" anchor="ctr"/>
+          <a:lstStyle/>
+          <a:p>
+            <a:pPr algn="ctr"/>
+            <a:r>
+              <a:rPr kumimoji="1" lang="en-US" altLang="zh-CN" sz="1600" dirty="0" err="1"/>
+              <a:t>Write_Enable_Delay</a:t>
+            </a:r>
+            <a:endParaRPr kumimoji="1" lang="en-US" altLang="zh-CN" sz="1600" dirty="0"/>
+          </a:p>
+          <a:p>
+            <a:pPr algn="ctr"/>
+            <a:r>
+              <a:rPr kumimoji="1" lang="en-US" altLang="zh-CN" sz="1600" dirty="0"/>
+              <a:t>Register</a:t>
+            </a:r>
+            <a:endParaRPr kumimoji="1" lang="zh-CN" altLang="en-US" sz="1600" dirty="0"/>
+          </a:p>
+        </p:txBody>
+      </p:sp>
+      <p:sp>
+        <p:nvSpPr>
+          <p:cNvPr id="14" name="圆角矩形 13">
+            <a:extLst>
+              <a:ext uri="{FF2B5EF4-FFF2-40B4-BE49-F238E27FC236}">
+                <a16:creationId xmlns:a16="http://schemas.microsoft.com/office/drawing/2014/main" id="{EAE53ABB-1072-C104-50C6-20AC373F940A}"/>
+              </a:ext>
+            </a:extLst>
+          </p:cNvPr>
+          <p:cNvSpPr/>
+          <p:nvPr/>
+        </p:nvSpPr>
+        <p:spPr>
+          <a:xfrm>
+            <a:off x="6042726" y="1075766"/>
+            <a:ext cx="995672" cy="727678"/>
+          </a:xfrm>
+          <a:prstGeom prst="roundRect">
+            <a:avLst/>
+          </a:prstGeom>
+        </p:spPr>
+        <p:style>
+          <a:lnRef idx="2">
+            <a:schemeClr val="accent1">
+              <a:shade val="15000"/>
+            </a:schemeClr>
+          </a:lnRef>
+          <a:fillRef idx="1">
+            <a:schemeClr val="accent1"/>
+          </a:fillRef>
+          <a:effectRef idx="0">
+            <a:schemeClr val="accent1"/>
+          </a:effectRef>
+          <a:fontRef idx="minor">
+            <a:schemeClr val="lt1"/>
+          </a:fontRef>
+        </p:style>
+        <p:txBody>
+          <a:bodyPr rtlCol="0" anchor="ctr"/>
+          <a:lstStyle/>
+          <a:p>
+            <a:pPr algn="ctr"/>
+            <a:r>
+              <a:rPr kumimoji="1" lang="en-US" altLang="zh-CN" sz="1400" dirty="0"/>
+              <a:t>Opcode</a:t>
+            </a:r>
+          </a:p>
+          <a:p>
+            <a:pPr algn="ctr"/>
+            <a:r>
+              <a:rPr kumimoji="1" lang="en-US" altLang="zh-CN" sz="1400" dirty="0"/>
+              <a:t>Register</a:t>
+            </a:r>
+            <a:endParaRPr kumimoji="1" lang="zh-CN" altLang="en-US" sz="1400" dirty="0"/>
+          </a:p>
+        </p:txBody>
+      </p:sp>
+      <p:sp>
+        <p:nvSpPr>
+          <p:cNvPr id="15" name="圆角矩形 14">
+            <a:extLst>
+              <a:ext uri="{FF2B5EF4-FFF2-40B4-BE49-F238E27FC236}">
+                <a16:creationId xmlns:a16="http://schemas.microsoft.com/office/drawing/2014/main" id="{B9D857E9-24D5-DCE8-D368-D1D35A70E51E}"/>
+              </a:ext>
+            </a:extLst>
+          </p:cNvPr>
+          <p:cNvSpPr/>
+          <p:nvPr/>
+        </p:nvSpPr>
+        <p:spPr>
+          <a:xfrm>
+            <a:off x="3198663" y="2600761"/>
+            <a:ext cx="974744" cy="727678"/>
+          </a:xfrm>
+          <a:prstGeom prst="roundRect">
+            <a:avLst/>
+          </a:prstGeom>
+          <a:solidFill>
+            <a:schemeClr val="accent1">
+              <a:lumMod val="60000"/>
+              <a:lumOff val="40000"/>
+            </a:schemeClr>
+          </a:solidFill>
+        </p:spPr>
+        <p:style>
+          <a:lnRef idx="2">
+            <a:schemeClr val="accent5">
+              <a:shade val="15000"/>
+            </a:schemeClr>
+          </a:lnRef>
+          <a:fillRef idx="1">
+            <a:schemeClr val="accent5"/>
+          </a:fillRef>
+          <a:effectRef idx="0">
+            <a:schemeClr val="accent5"/>
+          </a:effectRef>
+          <a:fontRef idx="minor">
+            <a:schemeClr val="lt1"/>
+          </a:fontRef>
+        </p:style>
+        <p:txBody>
+          <a:bodyPr rtlCol="0" anchor="ctr"/>
+          <a:lstStyle/>
+          <a:p>
+            <a:pPr algn="ctr"/>
+            <a:r>
+              <a:rPr kumimoji="1" lang="en-US" altLang="zh-CN" sz="1600" dirty="0"/>
+              <a:t>Ctrl</a:t>
+            </a:r>
+          </a:p>
+          <a:p>
+            <a:pPr algn="ctr"/>
+            <a:r>
+              <a:rPr kumimoji="1" lang="en-US" altLang="zh-CN" sz="1600" dirty="0"/>
+              <a:t>Register</a:t>
+            </a:r>
+            <a:endParaRPr kumimoji="1" lang="zh-CN" altLang="en-US" sz="1600" dirty="0"/>
+          </a:p>
+        </p:txBody>
+      </p:sp>
+      <p:sp>
+        <p:nvSpPr>
+          <p:cNvPr id="16" name="斜纹 15">
+            <a:extLst>
+              <a:ext uri="{FF2B5EF4-FFF2-40B4-BE49-F238E27FC236}">
+                <a16:creationId xmlns:a16="http://schemas.microsoft.com/office/drawing/2014/main" id="{35A09852-88AA-CB9D-9031-0D97EAA670CA}"/>
+              </a:ext>
+            </a:extLst>
+          </p:cNvPr>
+          <p:cNvSpPr/>
+          <p:nvPr/>
+        </p:nvSpPr>
+        <p:spPr>
+          <a:xfrm rot="8100000" flipH="1" flipV="1">
+            <a:off x="10879192" y="2531661"/>
+            <a:ext cx="939657" cy="939657"/>
+          </a:xfrm>
+          <a:prstGeom prst="diagStripe">
+            <a:avLst/>
+          </a:prstGeom>
+          <a:solidFill>
+            <a:schemeClr val="accent1">
+              <a:lumMod val="40000"/>
+              <a:lumOff val="60000"/>
+            </a:schemeClr>
+          </a:solidFill>
+        </p:spPr>
+        <p:style>
+          <a:lnRef idx="2">
+            <a:schemeClr val="accent3">
+              <a:shade val="15000"/>
+            </a:schemeClr>
+          </a:lnRef>
+          <a:fillRef idx="1">
+            <a:schemeClr val="accent3"/>
+          </a:fillRef>
+          <a:effectRef idx="0">
+            <a:schemeClr val="accent3"/>
+          </a:effectRef>
+          <a:fontRef idx="minor">
+            <a:schemeClr val="lt1"/>
+          </a:fontRef>
+        </p:style>
+        <p:txBody>
+          <a:bodyPr rtlCol="0" anchor="ctr"/>
+          <a:lstStyle/>
+          <a:p>
+            <a:pPr algn="ctr"/>
+            <a:endParaRPr kumimoji="1" lang="zh-CN" altLang="en-US" sz="1600" dirty="0">
+              <a:solidFill>
+                <a:schemeClr val="tx1"/>
+              </a:solidFill>
+            </a:endParaRPr>
+          </a:p>
+        </p:txBody>
+      </p:sp>
+      <p:sp>
+        <p:nvSpPr>
+          <p:cNvPr id="21" name="下箭头 20">
+            <a:extLst>
+              <a:ext uri="{FF2B5EF4-FFF2-40B4-BE49-F238E27FC236}">
+                <a16:creationId xmlns:a16="http://schemas.microsoft.com/office/drawing/2014/main" id="{96424ECE-27BC-B300-4B5C-543C5A07C43D}"/>
+              </a:ext>
+            </a:extLst>
+          </p:cNvPr>
+          <p:cNvSpPr/>
+          <p:nvPr/>
+        </p:nvSpPr>
+        <p:spPr>
+          <a:xfrm>
+            <a:off x="6343819" y="3235494"/>
+            <a:ext cx="222532" cy="230969"/>
+          </a:xfrm>
+          <a:prstGeom prst="downArrow">
+            <a:avLst/>
+          </a:prstGeom>
+        </p:spPr>
+        <p:style>
+          <a:lnRef idx="2">
+            <a:schemeClr val="accent3">
+              <a:shade val="15000"/>
+            </a:schemeClr>
+          </a:lnRef>
+          <a:fillRef idx="1">
+            <a:schemeClr val="accent3"/>
+          </a:fillRef>
+          <a:effectRef idx="0">
+            <a:schemeClr val="accent3"/>
+          </a:effectRef>
+          <a:fontRef idx="minor">
+            <a:schemeClr val="lt1"/>
+          </a:fontRef>
+        </p:style>
+        <p:txBody>
+          <a:bodyPr rtlCol="0" anchor="ctr"/>
+          <a:lstStyle/>
+          <a:p>
+            <a:pPr algn="ctr"/>
+            <a:endParaRPr kumimoji="1" lang="zh-CN" altLang="en-US" sz="1600" dirty="0"/>
+          </a:p>
+        </p:txBody>
+      </p:sp>
+      <p:sp>
+        <p:nvSpPr>
+          <p:cNvPr id="22" name="右箭头 21">
+            <a:extLst>
+              <a:ext uri="{FF2B5EF4-FFF2-40B4-BE49-F238E27FC236}">
+                <a16:creationId xmlns:a16="http://schemas.microsoft.com/office/drawing/2014/main" id="{A47A3A2F-2089-A6C3-0A86-0218597DDD64}"/>
+              </a:ext>
+            </a:extLst>
+          </p:cNvPr>
+          <p:cNvSpPr/>
+          <p:nvPr/>
+        </p:nvSpPr>
+        <p:spPr>
+          <a:xfrm>
+            <a:off x="7365927" y="2172694"/>
+            <a:ext cx="864484" cy="236502"/>
+          </a:xfrm>
+          <a:prstGeom prst="rightArrow">
+            <a:avLst/>
+          </a:prstGeom>
+          <a:solidFill>
+            <a:schemeClr val="accent2">
+              <a:lumMod val="60000"/>
+              <a:lumOff val="40000"/>
+            </a:schemeClr>
+          </a:solidFill>
+        </p:spPr>
+        <p:style>
+          <a:lnRef idx="2">
+            <a:schemeClr val="accent2">
+              <a:shade val="15000"/>
+            </a:schemeClr>
+          </a:lnRef>
+          <a:fillRef idx="1">
+            <a:schemeClr val="accent2"/>
+          </a:fillRef>
+          <a:effectRef idx="0">
+            <a:schemeClr val="accent2"/>
+          </a:effectRef>
+          <a:fontRef idx="minor">
+            <a:schemeClr val="lt1"/>
+          </a:fontRef>
+        </p:style>
+        <p:txBody>
+          <a:bodyPr rtlCol="0" anchor="ctr"/>
+          <a:lstStyle/>
+          <a:p>
+            <a:pPr algn="ctr"/>
+            <a:endParaRPr kumimoji="1" lang="zh-CN" altLang="en-US" sz="1600"/>
+          </a:p>
+        </p:txBody>
+      </p:sp>
+      <p:sp>
+        <p:nvSpPr>
+          <p:cNvPr id="23" name="右箭头 22">
+            <a:extLst>
+              <a:ext uri="{FF2B5EF4-FFF2-40B4-BE49-F238E27FC236}">
+                <a16:creationId xmlns:a16="http://schemas.microsoft.com/office/drawing/2014/main" id="{E44A3680-35DC-B4B5-A934-3289ACB2B00B}"/>
+              </a:ext>
+            </a:extLst>
+          </p:cNvPr>
+          <p:cNvSpPr/>
+          <p:nvPr/>
+        </p:nvSpPr>
+        <p:spPr>
+          <a:xfrm>
+            <a:off x="7365927" y="2812784"/>
+            <a:ext cx="864484" cy="236502"/>
+          </a:xfrm>
+          <a:prstGeom prst="rightArrow">
+            <a:avLst/>
+          </a:prstGeom>
+          <a:solidFill>
+            <a:schemeClr val="accent2">
+              <a:lumMod val="60000"/>
+              <a:lumOff val="40000"/>
+            </a:schemeClr>
+          </a:solidFill>
+        </p:spPr>
+        <p:style>
+          <a:lnRef idx="2">
+            <a:schemeClr val="accent1">
+              <a:shade val="15000"/>
+            </a:schemeClr>
+          </a:lnRef>
+          <a:fillRef idx="1">
+            <a:schemeClr val="accent1"/>
+          </a:fillRef>
+          <a:effectRef idx="0">
+            <a:schemeClr val="accent1"/>
+          </a:effectRef>
+          <a:fontRef idx="minor">
+            <a:schemeClr val="lt1"/>
+          </a:fontRef>
+        </p:style>
+        <p:txBody>
+          <a:bodyPr rtlCol="0" anchor="ctr"/>
+          <a:lstStyle/>
+          <a:p>
+            <a:pPr algn="ctr"/>
+            <a:endParaRPr kumimoji="1" lang="zh-CN" altLang="en-US" sz="1600"/>
+          </a:p>
+        </p:txBody>
+      </p:sp>
+      <p:sp>
+        <p:nvSpPr>
+          <p:cNvPr id="25" name="直角上箭头 24">
+            <a:extLst>
+              <a:ext uri="{FF2B5EF4-FFF2-40B4-BE49-F238E27FC236}">
+                <a16:creationId xmlns:a16="http://schemas.microsoft.com/office/drawing/2014/main" id="{906F9826-70E7-0CCA-F4F1-0CA0849B2866}"/>
+              </a:ext>
+            </a:extLst>
+          </p:cNvPr>
+          <p:cNvSpPr/>
+          <p:nvPr/>
+        </p:nvSpPr>
+        <p:spPr>
+          <a:xfrm flipV="1">
+            <a:off x="7244149" y="1395277"/>
+            <a:ext cx="1436334" cy="452426"/>
+          </a:xfrm>
+          <a:prstGeom prst="bentUpArrow">
+            <a:avLst/>
+          </a:prstGeom>
+          <a:solidFill>
+            <a:schemeClr val="accent1">
+              <a:lumMod val="20000"/>
+              <a:lumOff val="80000"/>
+            </a:schemeClr>
+          </a:solidFill>
+        </p:spPr>
+        <p:style>
+          <a:lnRef idx="2">
+            <a:schemeClr val="accent1">
+              <a:shade val="15000"/>
+            </a:schemeClr>
+          </a:lnRef>
+          <a:fillRef idx="1">
+            <a:schemeClr val="accent1"/>
+          </a:fillRef>
+          <a:effectRef idx="0">
+            <a:schemeClr val="accent1"/>
+          </a:effectRef>
+          <a:fontRef idx="minor">
+            <a:schemeClr val="lt1"/>
+          </a:fontRef>
+        </p:style>
+        <p:txBody>
+          <a:bodyPr rtlCol="0" anchor="ctr"/>
+          <a:lstStyle/>
+          <a:p>
+            <a:pPr algn="ctr"/>
+            <a:endParaRPr kumimoji="1" lang="zh-CN" altLang="en-US" sz="1600"/>
+          </a:p>
+        </p:txBody>
+      </p:sp>
+      <p:sp>
+        <p:nvSpPr>
+          <p:cNvPr id="26" name="右箭头 25">
+            <a:extLst>
+              <a:ext uri="{FF2B5EF4-FFF2-40B4-BE49-F238E27FC236}">
+                <a16:creationId xmlns:a16="http://schemas.microsoft.com/office/drawing/2014/main" id="{1AA0EC3A-02A9-98EF-46BD-B60602EB4423}"/>
+              </a:ext>
+            </a:extLst>
+          </p:cNvPr>
+          <p:cNvSpPr/>
+          <p:nvPr/>
+        </p:nvSpPr>
+        <p:spPr>
+          <a:xfrm>
+            <a:off x="1197044" y="1439605"/>
+            <a:ext cx="253105" cy="171232"/>
+          </a:xfrm>
+          <a:prstGeom prst="rightArrow">
+            <a:avLst/>
+          </a:prstGeom>
+          <a:solidFill>
+            <a:schemeClr val="accent1">
+              <a:lumMod val="75000"/>
+            </a:schemeClr>
+          </a:solidFill>
+        </p:spPr>
+        <p:style>
+          <a:lnRef idx="2">
+            <a:schemeClr val="accent1">
+              <a:shade val="15000"/>
+            </a:schemeClr>
+          </a:lnRef>
+          <a:fillRef idx="1">
+            <a:schemeClr val="accent1"/>
+          </a:fillRef>
+          <a:effectRef idx="0">
+            <a:schemeClr val="accent1"/>
+          </a:effectRef>
+          <a:fontRef idx="minor">
+            <a:schemeClr val="lt1"/>
+          </a:fontRef>
+        </p:style>
+        <p:txBody>
+          <a:bodyPr rtlCol="0" anchor="ctr"/>
+          <a:lstStyle/>
+          <a:p>
+            <a:pPr algn="ctr"/>
+            <a:endParaRPr kumimoji="1" lang="zh-CN" altLang="en-US" sz="1600"/>
+          </a:p>
+        </p:txBody>
+      </p:sp>
+      <p:sp>
+        <p:nvSpPr>
+          <p:cNvPr id="27" name="右箭头 26">
+            <a:extLst>
+              <a:ext uri="{FF2B5EF4-FFF2-40B4-BE49-F238E27FC236}">
+                <a16:creationId xmlns:a16="http://schemas.microsoft.com/office/drawing/2014/main" id="{0A3EDF68-26B8-3687-1B04-C78A066E1509}"/>
+              </a:ext>
+            </a:extLst>
+          </p:cNvPr>
+          <p:cNvSpPr/>
+          <p:nvPr/>
+        </p:nvSpPr>
+        <p:spPr>
+          <a:xfrm>
+            <a:off x="2841456" y="655646"/>
+            <a:ext cx="505263" cy="208811"/>
+          </a:xfrm>
+          <a:prstGeom prst="rightArrow">
+            <a:avLst/>
+          </a:prstGeom>
+          <a:solidFill>
+            <a:schemeClr val="accent1">
+              <a:lumMod val="75000"/>
+            </a:schemeClr>
+          </a:solidFill>
+        </p:spPr>
+        <p:style>
+          <a:lnRef idx="2">
+            <a:schemeClr val="accent1">
+              <a:shade val="15000"/>
+            </a:schemeClr>
+          </a:lnRef>
+          <a:fillRef idx="1">
+            <a:schemeClr val="accent1"/>
+          </a:fillRef>
+          <a:effectRef idx="0">
+            <a:schemeClr val="accent1"/>
+          </a:effectRef>
+          <a:fontRef idx="minor">
+            <a:schemeClr val="lt1"/>
+          </a:fontRef>
+        </p:style>
+        <p:txBody>
+          <a:bodyPr rtlCol="0" anchor="ctr"/>
+          <a:lstStyle/>
+          <a:p>
+            <a:pPr algn="ctr"/>
+            <a:endParaRPr kumimoji="1" lang="zh-CN" altLang="en-US" sz="1600"/>
+          </a:p>
+        </p:txBody>
+      </p:sp>
+      <p:sp>
+        <p:nvSpPr>
+          <p:cNvPr id="28" name="直角上箭头 27">
+            <a:extLst>
+              <a:ext uri="{FF2B5EF4-FFF2-40B4-BE49-F238E27FC236}">
+                <a16:creationId xmlns:a16="http://schemas.microsoft.com/office/drawing/2014/main" id="{DF1EAD87-E199-80E4-FD72-13A2B3DA8CF1}"/>
+              </a:ext>
+            </a:extLst>
+          </p:cNvPr>
+          <p:cNvSpPr/>
+          <p:nvPr/>
+        </p:nvSpPr>
+        <p:spPr>
+          <a:xfrm rot="5400000">
+            <a:off x="5025283" y="713351"/>
+            <a:ext cx="944776" cy="829368"/>
+          </a:xfrm>
+          <a:prstGeom prst="bentUpArrow">
+            <a:avLst>
+              <a:gd name="adj1" fmla="val 13781"/>
+              <a:gd name="adj2" fmla="val 13919"/>
+              <a:gd name="adj3" fmla="val 12802"/>
+            </a:avLst>
+          </a:prstGeom>
+          <a:solidFill>
+            <a:schemeClr val="accent1">
+              <a:lumMod val="60000"/>
+              <a:lumOff val="40000"/>
+            </a:schemeClr>
+          </a:solidFill>
+        </p:spPr>
+        <p:style>
+          <a:lnRef idx="2">
+            <a:schemeClr val="accent1">
+              <a:shade val="15000"/>
+            </a:schemeClr>
+          </a:lnRef>
+          <a:fillRef idx="1">
+            <a:schemeClr val="accent1"/>
+          </a:fillRef>
+          <a:effectRef idx="0">
+            <a:schemeClr val="accent1"/>
+          </a:effectRef>
+          <a:fontRef idx="minor">
+            <a:schemeClr val="lt1"/>
+          </a:fontRef>
+        </p:style>
+        <p:txBody>
+          <a:bodyPr rtlCol="0" anchor="ctr"/>
+          <a:lstStyle/>
+          <a:p>
+            <a:pPr algn="ctr"/>
+            <a:endParaRPr kumimoji="1" lang="zh-CN" altLang="en-US" sz="1600"/>
+          </a:p>
+        </p:txBody>
+      </p:sp>
+      <p:sp>
+        <p:nvSpPr>
+          <p:cNvPr id="29" name="直角上箭头 28">
+            <a:extLst>
+              <a:ext uri="{FF2B5EF4-FFF2-40B4-BE49-F238E27FC236}">
+                <a16:creationId xmlns:a16="http://schemas.microsoft.com/office/drawing/2014/main" id="{80DD8FF6-7B76-9616-B8E3-CEF89718323F}"/>
+              </a:ext>
+            </a:extLst>
+          </p:cNvPr>
+          <p:cNvSpPr/>
+          <p:nvPr/>
+        </p:nvSpPr>
+        <p:spPr>
+          <a:xfrm flipV="1">
+            <a:off x="7581030" y="594840"/>
+            <a:ext cx="3746960" cy="452426"/>
+          </a:xfrm>
+          <a:prstGeom prst="bentUpArrow">
+            <a:avLst/>
+          </a:prstGeom>
+          <a:solidFill>
+            <a:schemeClr val="accent1">
+              <a:lumMod val="60000"/>
+              <a:lumOff val="40000"/>
+            </a:schemeClr>
+          </a:solidFill>
+        </p:spPr>
+        <p:style>
+          <a:lnRef idx="2">
+            <a:schemeClr val="accent1">
+              <a:shade val="15000"/>
+            </a:schemeClr>
+          </a:lnRef>
+          <a:fillRef idx="1">
+            <a:schemeClr val="accent1"/>
+          </a:fillRef>
+          <a:effectRef idx="0">
+            <a:schemeClr val="accent1"/>
+          </a:effectRef>
+          <a:fontRef idx="minor">
+            <a:schemeClr val="lt1"/>
+          </a:fontRef>
+        </p:style>
+        <p:txBody>
+          <a:bodyPr rtlCol="0" anchor="ctr"/>
+          <a:lstStyle/>
+          <a:p>
+            <a:pPr algn="ctr"/>
+            <a:endParaRPr kumimoji="1" lang="zh-CN" altLang="en-US" sz="1600"/>
+          </a:p>
+        </p:txBody>
+      </p:sp>
+      <p:sp>
+        <p:nvSpPr>
+          <p:cNvPr id="31" name="右箭头 30">
+            <a:extLst>
+              <a:ext uri="{FF2B5EF4-FFF2-40B4-BE49-F238E27FC236}">
+                <a16:creationId xmlns:a16="http://schemas.microsoft.com/office/drawing/2014/main" id="{DA9E45BF-EBA4-DE69-4AA1-CC6E2B78B24F}"/>
+              </a:ext>
+            </a:extLst>
+          </p:cNvPr>
+          <p:cNvSpPr/>
+          <p:nvPr/>
+        </p:nvSpPr>
+        <p:spPr>
+          <a:xfrm>
+            <a:off x="7365926" y="3690464"/>
+            <a:ext cx="864484" cy="236502"/>
+          </a:xfrm>
+          <a:prstGeom prst="rightArrow">
+            <a:avLst/>
+          </a:prstGeom>
+          <a:solidFill>
+            <a:schemeClr val="accent2">
+              <a:lumMod val="60000"/>
+              <a:lumOff val="40000"/>
+            </a:schemeClr>
+          </a:solidFill>
+        </p:spPr>
+        <p:style>
+          <a:lnRef idx="2">
+            <a:schemeClr val="accent1">
+              <a:shade val="15000"/>
+            </a:schemeClr>
+          </a:lnRef>
+          <a:fillRef idx="1">
+            <a:schemeClr val="accent1"/>
+          </a:fillRef>
+          <a:effectRef idx="0">
+            <a:schemeClr val="accent1"/>
+          </a:effectRef>
+          <a:fontRef idx="minor">
+            <a:schemeClr val="lt1"/>
+          </a:fontRef>
+        </p:style>
+        <p:txBody>
+          <a:bodyPr rtlCol="0" anchor="ctr"/>
+          <a:lstStyle/>
+          <a:p>
+            <a:pPr algn="ctr"/>
+            <a:endParaRPr kumimoji="1" lang="zh-CN" altLang="en-US" sz="1600"/>
+          </a:p>
+        </p:txBody>
+      </p:sp>
+      <p:sp>
+        <p:nvSpPr>
+          <p:cNvPr id="32" name="下箭头 31">
+            <a:extLst>
+              <a:ext uri="{FF2B5EF4-FFF2-40B4-BE49-F238E27FC236}">
+                <a16:creationId xmlns:a16="http://schemas.microsoft.com/office/drawing/2014/main" id="{200DD7E0-4657-CDE6-6B40-4B2DB53ADDFC}"/>
+              </a:ext>
+            </a:extLst>
+          </p:cNvPr>
+          <p:cNvSpPr/>
+          <p:nvPr/>
+        </p:nvSpPr>
+        <p:spPr>
+          <a:xfrm>
+            <a:off x="11105458" y="2057209"/>
+            <a:ext cx="222532" cy="230969"/>
+          </a:xfrm>
+          <a:prstGeom prst="downArrow">
+            <a:avLst/>
+          </a:prstGeom>
+          <a:solidFill>
+            <a:schemeClr val="accent1">
+              <a:lumMod val="40000"/>
+              <a:lumOff val="60000"/>
+            </a:schemeClr>
+          </a:solidFill>
+        </p:spPr>
+        <p:style>
+          <a:lnRef idx="2">
+            <a:schemeClr val="accent1">
+              <a:shade val="15000"/>
+            </a:schemeClr>
+          </a:lnRef>
+          <a:fillRef idx="1">
+            <a:schemeClr val="accent1"/>
+          </a:fillRef>
+          <a:effectRef idx="0">
+            <a:schemeClr val="accent1"/>
+          </a:effectRef>
+          <a:fontRef idx="minor">
+            <a:schemeClr val="lt1"/>
+          </a:fontRef>
+        </p:style>
+        <p:txBody>
+          <a:bodyPr rtlCol="0" anchor="ctr"/>
+          <a:lstStyle/>
+          <a:p>
+            <a:pPr algn="ctr"/>
+            <a:endParaRPr kumimoji="1" lang="zh-CN" altLang="en-US" sz="1600" dirty="0"/>
+          </a:p>
+        </p:txBody>
+      </p:sp>
+      <p:sp>
+        <p:nvSpPr>
+          <p:cNvPr id="49" name="右箭头 48">
+            <a:extLst>
+              <a:ext uri="{FF2B5EF4-FFF2-40B4-BE49-F238E27FC236}">
+                <a16:creationId xmlns:a16="http://schemas.microsoft.com/office/drawing/2014/main" id="{2E874A21-0E96-1999-B1A0-991608343D0E}"/>
+              </a:ext>
+            </a:extLst>
+          </p:cNvPr>
+          <p:cNvSpPr/>
+          <p:nvPr/>
+        </p:nvSpPr>
+        <p:spPr>
+          <a:xfrm>
+            <a:off x="5296012" y="2172695"/>
+            <a:ext cx="456060" cy="259094"/>
+          </a:xfrm>
+          <a:prstGeom prst="rightArrow">
+            <a:avLst/>
+          </a:prstGeom>
+          <a:solidFill>
+            <a:schemeClr val="accent1">
+              <a:lumMod val="40000"/>
+              <a:lumOff val="60000"/>
+            </a:schemeClr>
+          </a:solidFill>
+        </p:spPr>
+        <p:style>
+          <a:lnRef idx="2">
+            <a:schemeClr val="accent2">
+              <a:shade val="15000"/>
+            </a:schemeClr>
+          </a:lnRef>
+          <a:fillRef idx="1">
+            <a:schemeClr val="accent2"/>
+          </a:fillRef>
+          <a:effectRef idx="0">
+            <a:schemeClr val="accent2"/>
+          </a:effectRef>
+          <a:fontRef idx="minor">
+            <a:schemeClr val="lt1"/>
+          </a:fontRef>
+        </p:style>
+        <p:txBody>
+          <a:bodyPr rtlCol="0" anchor="ctr"/>
+          <a:lstStyle/>
+          <a:p>
+            <a:pPr algn="ctr"/>
+            <a:endParaRPr kumimoji="1" lang="zh-CN" altLang="en-US" sz="1600"/>
+          </a:p>
+        </p:txBody>
+      </p:sp>
+      <p:sp>
+        <p:nvSpPr>
+          <p:cNvPr id="50" name="右箭头 49">
+            <a:extLst>
+              <a:ext uri="{FF2B5EF4-FFF2-40B4-BE49-F238E27FC236}">
+                <a16:creationId xmlns:a16="http://schemas.microsoft.com/office/drawing/2014/main" id="{B6CEA51F-7EF9-88B8-1E6A-3886039A76E4}"/>
+              </a:ext>
+            </a:extLst>
+          </p:cNvPr>
+          <p:cNvSpPr/>
+          <p:nvPr/>
+        </p:nvSpPr>
+        <p:spPr>
+          <a:xfrm>
+            <a:off x="5296012" y="2784396"/>
+            <a:ext cx="456972" cy="259094"/>
+          </a:xfrm>
+          <a:prstGeom prst="rightArrow">
+            <a:avLst/>
+          </a:prstGeom>
+          <a:solidFill>
+            <a:schemeClr val="accent1">
+              <a:lumMod val="40000"/>
+              <a:lumOff val="60000"/>
+            </a:schemeClr>
+          </a:solidFill>
+        </p:spPr>
+        <p:style>
+          <a:lnRef idx="2">
+            <a:schemeClr val="accent2">
+              <a:shade val="15000"/>
+            </a:schemeClr>
+          </a:lnRef>
+          <a:fillRef idx="1">
+            <a:schemeClr val="accent2"/>
+          </a:fillRef>
+          <a:effectRef idx="0">
+            <a:schemeClr val="accent2"/>
+          </a:effectRef>
+          <a:fontRef idx="minor">
+            <a:schemeClr val="lt1"/>
+          </a:fontRef>
+        </p:style>
+        <p:txBody>
+          <a:bodyPr rtlCol="0" anchor="ctr"/>
+          <a:lstStyle/>
+          <a:p>
+            <a:pPr algn="ctr"/>
+            <a:endParaRPr kumimoji="1" lang="zh-CN" altLang="en-US" sz="1600"/>
+          </a:p>
+        </p:txBody>
+      </p:sp>
+      <p:sp>
+        <p:nvSpPr>
+          <p:cNvPr id="51" name="右箭头 50">
+            <a:extLst>
+              <a:ext uri="{FF2B5EF4-FFF2-40B4-BE49-F238E27FC236}">
+                <a16:creationId xmlns:a16="http://schemas.microsoft.com/office/drawing/2014/main" id="{2215579E-67AC-EFF1-07D9-91C59284C08B}"/>
+              </a:ext>
+            </a:extLst>
+          </p:cNvPr>
+          <p:cNvSpPr/>
+          <p:nvPr/>
+        </p:nvSpPr>
+        <p:spPr>
+          <a:xfrm>
+            <a:off x="5294866" y="4506822"/>
+            <a:ext cx="456972" cy="259094"/>
+          </a:xfrm>
+          <a:prstGeom prst="rightArrow">
+            <a:avLst/>
+          </a:prstGeom>
+          <a:solidFill>
+            <a:schemeClr val="accent1">
+              <a:lumMod val="40000"/>
+              <a:lumOff val="60000"/>
+            </a:schemeClr>
+          </a:solidFill>
+        </p:spPr>
+        <p:style>
+          <a:lnRef idx="2">
+            <a:schemeClr val="accent2">
+              <a:shade val="15000"/>
+            </a:schemeClr>
+          </a:lnRef>
+          <a:fillRef idx="1">
+            <a:schemeClr val="accent2"/>
+          </a:fillRef>
+          <a:effectRef idx="0">
+            <a:schemeClr val="accent2"/>
+          </a:effectRef>
+          <a:fontRef idx="minor">
+            <a:schemeClr val="lt1"/>
+          </a:fontRef>
+        </p:style>
+        <p:txBody>
+          <a:bodyPr rtlCol="0" anchor="ctr"/>
+          <a:lstStyle/>
+          <a:p>
+            <a:pPr algn="ctr"/>
+            <a:endParaRPr kumimoji="1" lang="zh-CN" altLang="en-US" sz="1600"/>
+          </a:p>
+        </p:txBody>
+      </p:sp>
+      <p:sp>
+        <p:nvSpPr>
+          <p:cNvPr id="53" name="右箭头 52">
+            <a:extLst>
+              <a:ext uri="{FF2B5EF4-FFF2-40B4-BE49-F238E27FC236}">
+                <a16:creationId xmlns:a16="http://schemas.microsoft.com/office/drawing/2014/main" id="{2C6883A9-A341-0C3B-928A-A12620099DED}"/>
+              </a:ext>
+            </a:extLst>
+          </p:cNvPr>
+          <p:cNvSpPr/>
+          <p:nvPr/>
+        </p:nvSpPr>
+        <p:spPr>
+          <a:xfrm>
+            <a:off x="11539881" y="2934854"/>
+            <a:ext cx="241732" cy="134747"/>
+          </a:xfrm>
+          <a:prstGeom prst="rightArrow">
+            <a:avLst>
+              <a:gd name="adj1" fmla="val 99557"/>
+              <a:gd name="adj2" fmla="val 50000"/>
+            </a:avLst>
+          </a:prstGeom>
+          <a:solidFill>
+            <a:schemeClr val="accent1">
+              <a:lumMod val="40000"/>
+              <a:lumOff val="60000"/>
+            </a:schemeClr>
+          </a:solidFill>
+        </p:spPr>
+        <p:style>
+          <a:lnRef idx="2">
+            <a:schemeClr val="accent2">
+              <a:shade val="15000"/>
+            </a:schemeClr>
+          </a:lnRef>
+          <a:fillRef idx="1">
+            <a:schemeClr val="accent2"/>
+          </a:fillRef>
+          <a:effectRef idx="0">
+            <a:schemeClr val="accent2"/>
+          </a:effectRef>
+          <a:fontRef idx="minor">
+            <a:schemeClr val="lt1"/>
+          </a:fontRef>
+        </p:style>
+        <p:txBody>
+          <a:bodyPr rtlCol="0" anchor="ctr"/>
+          <a:lstStyle/>
+          <a:p>
+            <a:pPr algn="ctr"/>
+            <a:endParaRPr kumimoji="1" lang="zh-CN" altLang="en-US" sz="1600"/>
+          </a:p>
+        </p:txBody>
+      </p:sp>
+      <p:sp>
+        <p:nvSpPr>
+          <p:cNvPr id="52" name="直角上箭头 51">
+            <a:extLst>
+              <a:ext uri="{FF2B5EF4-FFF2-40B4-BE49-F238E27FC236}">
+                <a16:creationId xmlns:a16="http://schemas.microsoft.com/office/drawing/2014/main" id="{3DFCAABD-CE53-A040-FC52-36AA71EA057E}"/>
+              </a:ext>
+            </a:extLst>
+          </p:cNvPr>
+          <p:cNvSpPr/>
+          <p:nvPr/>
+        </p:nvSpPr>
+        <p:spPr>
+          <a:xfrm rot="5400000" flipV="1">
+            <a:off x="7174187" y="1055536"/>
+            <a:ext cx="2728108" cy="6486744"/>
+          </a:xfrm>
+          <a:prstGeom prst="bentUpArrow">
+            <a:avLst>
+              <a:gd name="adj1" fmla="val 4948"/>
+              <a:gd name="adj2" fmla="val 2594"/>
+              <a:gd name="adj3" fmla="val 0"/>
+            </a:avLst>
+          </a:prstGeom>
+          <a:solidFill>
+            <a:schemeClr val="accent1">
+              <a:lumMod val="40000"/>
+              <a:lumOff val="60000"/>
+            </a:schemeClr>
+          </a:solidFill>
+        </p:spPr>
+        <p:style>
+          <a:lnRef idx="2">
+            <a:schemeClr val="accent2">
+              <a:shade val="15000"/>
+            </a:schemeClr>
+          </a:lnRef>
+          <a:fillRef idx="1">
+            <a:schemeClr val="accent2"/>
+          </a:fillRef>
+          <a:effectRef idx="0">
+            <a:schemeClr val="accent2"/>
+          </a:effectRef>
+          <a:fontRef idx="minor">
+            <a:schemeClr val="lt1"/>
+          </a:fontRef>
+        </p:style>
+        <p:txBody>
+          <a:bodyPr rtlCol="0" anchor="ctr"/>
+          <a:lstStyle/>
+          <a:p>
+            <a:pPr algn="ctr"/>
+            <a:endParaRPr kumimoji="1" lang="zh-CN" altLang="en-US" sz="1600"/>
+          </a:p>
+        </p:txBody>
+      </p:sp>
+      <p:sp>
+        <p:nvSpPr>
+          <p:cNvPr id="48" name="上下箭头 47">
+            <a:extLst>
+              <a:ext uri="{FF2B5EF4-FFF2-40B4-BE49-F238E27FC236}">
+                <a16:creationId xmlns:a16="http://schemas.microsoft.com/office/drawing/2014/main" id="{8937D603-D699-9E0F-69F8-4ADE47CFE5BD}"/>
+              </a:ext>
+            </a:extLst>
+          </p:cNvPr>
+          <p:cNvSpPr/>
+          <p:nvPr/>
+        </p:nvSpPr>
+        <p:spPr>
+          <a:xfrm>
+            <a:off x="5177626" y="2232232"/>
+            <a:ext cx="149766" cy="3430730"/>
+          </a:xfrm>
+          <a:prstGeom prst="upDownArrow">
+            <a:avLst>
+              <a:gd name="adj1" fmla="val 96352"/>
+              <a:gd name="adj2" fmla="val 0"/>
+            </a:avLst>
+          </a:prstGeom>
+          <a:solidFill>
+            <a:schemeClr val="accent1">
+              <a:lumMod val="40000"/>
+              <a:lumOff val="60000"/>
+            </a:schemeClr>
+          </a:solidFill>
+        </p:spPr>
+        <p:style>
+          <a:lnRef idx="2">
+            <a:schemeClr val="accent2">
+              <a:shade val="15000"/>
+            </a:schemeClr>
+          </a:lnRef>
+          <a:fillRef idx="1">
+            <a:schemeClr val="accent2"/>
+          </a:fillRef>
+          <a:effectRef idx="0">
+            <a:schemeClr val="accent2"/>
+          </a:effectRef>
+          <a:fontRef idx="minor">
+            <a:schemeClr val="lt1"/>
+          </a:fontRef>
+        </p:style>
+        <p:txBody>
+          <a:bodyPr rtlCol="0" anchor="ctr"/>
+          <a:lstStyle/>
+          <a:p>
+            <a:pPr algn="ctr"/>
+            <a:endParaRPr kumimoji="1" lang="zh-CN" altLang="en-US" sz="1600"/>
+          </a:p>
+        </p:txBody>
+      </p:sp>
+      <p:sp>
+        <p:nvSpPr>
+          <p:cNvPr id="54" name="圆角矩形 53">
+            <a:extLst>
+              <a:ext uri="{FF2B5EF4-FFF2-40B4-BE49-F238E27FC236}">
+                <a16:creationId xmlns:a16="http://schemas.microsoft.com/office/drawing/2014/main" id="{2633C9B6-124E-A86B-C35C-6EB8A69513F5}"/>
+              </a:ext>
+            </a:extLst>
+          </p:cNvPr>
+          <p:cNvSpPr/>
+          <p:nvPr/>
+        </p:nvSpPr>
+        <p:spPr>
+          <a:xfrm>
+            <a:off x="3206333" y="1470402"/>
+            <a:ext cx="959405" cy="727678"/>
+          </a:xfrm>
+          <a:prstGeom prst="roundRect">
+            <a:avLst/>
+          </a:prstGeom>
+        </p:spPr>
+        <p:style>
+          <a:lnRef idx="2">
+            <a:schemeClr val="accent1">
+              <a:shade val="15000"/>
+            </a:schemeClr>
+          </a:lnRef>
+          <a:fillRef idx="1">
+            <a:schemeClr val="accent1"/>
+          </a:fillRef>
+          <a:effectRef idx="0">
+            <a:schemeClr val="accent1"/>
+          </a:effectRef>
+          <a:fontRef idx="minor">
+            <a:schemeClr val="lt1"/>
+          </a:fontRef>
+        </p:style>
+        <p:txBody>
+          <a:bodyPr rtlCol="0" anchor="ctr"/>
+          <a:lstStyle/>
+          <a:p>
+            <a:pPr algn="ctr"/>
+            <a:r>
+              <a:rPr kumimoji="1" lang="en-US" altLang="zh-CN" sz="1400" dirty="0"/>
+              <a:t>Cond</a:t>
+            </a:r>
+          </a:p>
+          <a:p>
+            <a:pPr algn="ctr"/>
+            <a:r>
+              <a:rPr kumimoji="1" lang="en-US" altLang="zh-CN" sz="1400" dirty="0"/>
+              <a:t>Register</a:t>
+            </a:r>
+            <a:endParaRPr kumimoji="1" lang="zh-CN" altLang="en-US" sz="1400" dirty="0"/>
+          </a:p>
+        </p:txBody>
+      </p:sp>
+      <p:sp>
+        <p:nvSpPr>
+          <p:cNvPr id="55" name="下箭头 54">
+            <a:extLst>
+              <a:ext uri="{FF2B5EF4-FFF2-40B4-BE49-F238E27FC236}">
+                <a16:creationId xmlns:a16="http://schemas.microsoft.com/office/drawing/2014/main" id="{104572D0-4DFD-E2A6-5267-82CB6C00DC48}"/>
+              </a:ext>
+            </a:extLst>
+          </p:cNvPr>
+          <p:cNvSpPr/>
+          <p:nvPr/>
+        </p:nvSpPr>
+        <p:spPr>
+          <a:xfrm>
+            <a:off x="3585711" y="1164308"/>
+            <a:ext cx="222532" cy="230969"/>
+          </a:xfrm>
+          <a:prstGeom prst="downArrow">
+            <a:avLst/>
+          </a:prstGeom>
+          <a:solidFill>
+            <a:schemeClr val="accent1">
+              <a:lumMod val="60000"/>
+              <a:lumOff val="40000"/>
+            </a:schemeClr>
+          </a:solidFill>
+        </p:spPr>
+        <p:style>
+          <a:lnRef idx="2">
+            <a:schemeClr val="accent1">
+              <a:shade val="15000"/>
+            </a:schemeClr>
+          </a:lnRef>
+          <a:fillRef idx="1">
+            <a:schemeClr val="accent1"/>
+          </a:fillRef>
+          <a:effectRef idx="0">
+            <a:schemeClr val="accent1"/>
+          </a:effectRef>
+          <a:fontRef idx="minor">
+            <a:schemeClr val="lt1"/>
+          </a:fontRef>
+        </p:style>
+        <p:txBody>
+          <a:bodyPr rtlCol="0" anchor="ctr"/>
+          <a:lstStyle/>
+          <a:p>
+            <a:pPr algn="ctr"/>
+            <a:endParaRPr kumimoji="1" lang="zh-CN" altLang="en-US" sz="1600" dirty="0"/>
+          </a:p>
+        </p:txBody>
+      </p:sp>
+      <p:sp>
+        <p:nvSpPr>
+          <p:cNvPr id="56" name="下箭头 55">
+            <a:extLst>
+              <a:ext uri="{FF2B5EF4-FFF2-40B4-BE49-F238E27FC236}">
+                <a16:creationId xmlns:a16="http://schemas.microsoft.com/office/drawing/2014/main" id="{BF85882F-3E46-22B4-FA25-4F1F83DFFAD4}"/>
+              </a:ext>
+            </a:extLst>
+          </p:cNvPr>
+          <p:cNvSpPr/>
+          <p:nvPr/>
+        </p:nvSpPr>
+        <p:spPr>
+          <a:xfrm>
+            <a:off x="3583962" y="2282217"/>
+            <a:ext cx="222532" cy="230969"/>
+          </a:xfrm>
+          <a:prstGeom prst="downArrow">
+            <a:avLst/>
+          </a:prstGeom>
+          <a:solidFill>
+            <a:schemeClr val="accent1">
+              <a:lumMod val="20000"/>
+              <a:lumOff val="80000"/>
+            </a:schemeClr>
+          </a:solidFill>
+        </p:spPr>
+        <p:style>
+          <a:lnRef idx="2">
+            <a:schemeClr val="accent1">
+              <a:shade val="15000"/>
+            </a:schemeClr>
+          </a:lnRef>
+          <a:fillRef idx="1">
+            <a:schemeClr val="accent1"/>
+          </a:fillRef>
+          <a:effectRef idx="0">
+            <a:schemeClr val="accent1"/>
+          </a:effectRef>
+          <a:fontRef idx="minor">
+            <a:schemeClr val="lt1"/>
+          </a:fontRef>
+        </p:style>
+        <p:txBody>
+          <a:bodyPr rtlCol="0" anchor="ctr"/>
+          <a:lstStyle/>
+          <a:p>
+            <a:pPr algn="ctr"/>
+            <a:endParaRPr kumimoji="1" lang="zh-CN" altLang="en-US" sz="1600" dirty="0"/>
+          </a:p>
+        </p:txBody>
+      </p:sp>
+      <p:sp>
+        <p:nvSpPr>
+          <p:cNvPr id="57" name="直角上箭头 56">
+            <a:extLst>
+              <a:ext uri="{FF2B5EF4-FFF2-40B4-BE49-F238E27FC236}">
+                <a16:creationId xmlns:a16="http://schemas.microsoft.com/office/drawing/2014/main" id="{9288F40F-D754-E153-ECA7-9BCB0FCF2ACF}"/>
+              </a:ext>
+            </a:extLst>
+          </p:cNvPr>
+          <p:cNvSpPr/>
+          <p:nvPr/>
+        </p:nvSpPr>
+        <p:spPr>
+          <a:xfrm flipH="1">
+            <a:off x="498763" y="1976386"/>
+            <a:ext cx="2577703" cy="1168657"/>
+          </a:xfrm>
+          <a:prstGeom prst="bentUpArrow">
+            <a:avLst>
+              <a:gd name="adj1" fmla="val 9749"/>
+              <a:gd name="adj2" fmla="val 12217"/>
+              <a:gd name="adj3" fmla="val 14683"/>
+            </a:avLst>
+          </a:prstGeom>
+        </p:spPr>
+        <p:style>
+          <a:lnRef idx="2">
+            <a:schemeClr val="accent1">
+              <a:shade val="15000"/>
+            </a:schemeClr>
+          </a:lnRef>
+          <a:fillRef idx="1">
+            <a:schemeClr val="accent1"/>
+          </a:fillRef>
+          <a:effectRef idx="0">
+            <a:schemeClr val="accent1"/>
+          </a:effectRef>
+          <a:fontRef idx="minor">
+            <a:schemeClr val="lt1"/>
+          </a:fontRef>
+        </p:style>
+        <p:txBody>
+          <a:bodyPr rtlCol="0" anchor="ctr"/>
+          <a:lstStyle/>
+          <a:p>
+            <a:pPr algn="ctr"/>
+            <a:endParaRPr kumimoji="1" lang="zh-CN" altLang="en-US" sz="1600"/>
+          </a:p>
+        </p:txBody>
+      </p:sp>
+      <p:sp>
+        <p:nvSpPr>
+          <p:cNvPr id="58" name="圆角矩形 57">
+            <a:extLst>
+              <a:ext uri="{FF2B5EF4-FFF2-40B4-BE49-F238E27FC236}">
+                <a16:creationId xmlns:a16="http://schemas.microsoft.com/office/drawing/2014/main" id="{AD336440-AF7C-BB44-D2DC-8131F05B5C12}"/>
+              </a:ext>
+            </a:extLst>
+          </p:cNvPr>
+          <p:cNvSpPr/>
+          <p:nvPr/>
+        </p:nvSpPr>
+        <p:spPr>
+          <a:xfrm>
+            <a:off x="663072" y="3690464"/>
+            <a:ext cx="1268365" cy="520386"/>
+          </a:xfrm>
+          <a:prstGeom prst="roundRect">
+            <a:avLst/>
+          </a:prstGeom>
+          <a:solidFill>
+            <a:schemeClr val="accent1">
+              <a:lumMod val="75000"/>
+            </a:schemeClr>
+          </a:solidFill>
+        </p:spPr>
+        <p:style>
+          <a:lnRef idx="2">
+            <a:schemeClr val="accent5">
+              <a:shade val="15000"/>
+            </a:schemeClr>
+          </a:lnRef>
+          <a:fillRef idx="1">
+            <a:schemeClr val="accent5"/>
+          </a:fillRef>
+          <a:effectRef idx="0">
+            <a:schemeClr val="accent5"/>
+          </a:effectRef>
+          <a:fontRef idx="minor">
+            <a:schemeClr val="lt1"/>
+          </a:fontRef>
+        </p:style>
+        <p:txBody>
+          <a:bodyPr rtlCol="0" anchor="ctr"/>
+          <a:lstStyle/>
+          <a:p>
+            <a:pPr algn="ctr"/>
+            <a:r>
+              <a:rPr kumimoji="1" lang="en-US" altLang="zh-CN" sz="1600" dirty="0"/>
+              <a:t>FETCH</a:t>
+            </a:r>
+            <a:endParaRPr kumimoji="1" lang="zh-CN" altLang="en-US" sz="1600" dirty="0"/>
+          </a:p>
+        </p:txBody>
+      </p:sp>
+      <p:sp>
+        <p:nvSpPr>
+          <p:cNvPr id="59" name="圆角矩形 58">
+            <a:extLst>
+              <a:ext uri="{FF2B5EF4-FFF2-40B4-BE49-F238E27FC236}">
+                <a16:creationId xmlns:a16="http://schemas.microsoft.com/office/drawing/2014/main" id="{B0DF9041-D241-0976-AF3A-B5B98248222C}"/>
+              </a:ext>
+            </a:extLst>
+          </p:cNvPr>
+          <p:cNvSpPr/>
+          <p:nvPr/>
+        </p:nvSpPr>
+        <p:spPr>
+          <a:xfrm>
+            <a:off x="650151" y="4355886"/>
+            <a:ext cx="1281662" cy="520386"/>
+          </a:xfrm>
+          <a:prstGeom prst="roundRect">
+            <a:avLst/>
+          </a:prstGeom>
+        </p:spPr>
+        <p:style>
+          <a:lnRef idx="2">
+            <a:schemeClr val="accent1">
+              <a:shade val="15000"/>
+            </a:schemeClr>
+          </a:lnRef>
+          <a:fillRef idx="1">
+            <a:schemeClr val="accent1"/>
+          </a:fillRef>
+          <a:effectRef idx="0">
+            <a:schemeClr val="accent1"/>
+          </a:effectRef>
+          <a:fontRef idx="minor">
+            <a:schemeClr val="lt1"/>
+          </a:fontRef>
+        </p:style>
+        <p:txBody>
+          <a:bodyPr rtlCol="0" anchor="ctr"/>
+          <a:lstStyle/>
+          <a:p>
+            <a:pPr algn="ctr"/>
+            <a:r>
+              <a:rPr kumimoji="1" lang="en-US" altLang="zh-CN" sz="1600" dirty="0"/>
+              <a:t>DECODE</a:t>
+            </a:r>
+            <a:endParaRPr kumimoji="1" lang="zh-CN" altLang="en-US" sz="1600" dirty="0"/>
+          </a:p>
+        </p:txBody>
+      </p:sp>
+      <p:sp>
+        <p:nvSpPr>
+          <p:cNvPr id="60" name="圆角矩形 59">
+            <a:extLst>
+              <a:ext uri="{FF2B5EF4-FFF2-40B4-BE49-F238E27FC236}">
+                <a16:creationId xmlns:a16="http://schemas.microsoft.com/office/drawing/2014/main" id="{2801F6CF-7B59-C916-714F-C4E300E92934}"/>
+              </a:ext>
+            </a:extLst>
+          </p:cNvPr>
+          <p:cNvSpPr/>
+          <p:nvPr/>
+        </p:nvSpPr>
+        <p:spPr>
+          <a:xfrm>
+            <a:off x="650151" y="5016679"/>
+            <a:ext cx="1281662" cy="520386"/>
+          </a:xfrm>
+          <a:prstGeom prst="roundRect">
+            <a:avLst/>
+          </a:prstGeom>
+          <a:solidFill>
+            <a:schemeClr val="accent1">
+              <a:lumMod val="60000"/>
+              <a:lumOff val="40000"/>
+            </a:schemeClr>
+          </a:solidFill>
+        </p:spPr>
+        <p:style>
+          <a:lnRef idx="2">
+            <a:schemeClr val="accent1">
+              <a:shade val="15000"/>
+            </a:schemeClr>
+          </a:lnRef>
+          <a:fillRef idx="1">
+            <a:schemeClr val="accent1"/>
+          </a:fillRef>
+          <a:effectRef idx="0">
+            <a:schemeClr val="accent1"/>
+          </a:effectRef>
+          <a:fontRef idx="minor">
+            <a:schemeClr val="lt1"/>
+          </a:fontRef>
+        </p:style>
+        <p:txBody>
+          <a:bodyPr rtlCol="0" anchor="ctr"/>
+          <a:lstStyle/>
+          <a:p>
+            <a:pPr algn="ctr"/>
+            <a:r>
+              <a:rPr kumimoji="1" lang="en-US" altLang="zh-CN" sz="1600" dirty="0"/>
+              <a:t>EXECUTE</a:t>
+            </a:r>
+            <a:endParaRPr kumimoji="1" lang="zh-CN" altLang="en-US" sz="1600" dirty="0"/>
+          </a:p>
+        </p:txBody>
+      </p:sp>
+      <p:sp>
+        <p:nvSpPr>
+          <p:cNvPr id="61" name="矩形 60">
+            <a:extLst>
+              <a:ext uri="{FF2B5EF4-FFF2-40B4-BE49-F238E27FC236}">
+                <a16:creationId xmlns:a16="http://schemas.microsoft.com/office/drawing/2014/main" id="{AE887016-CA9A-32B6-E74D-494FBA1BE03C}"/>
+              </a:ext>
+            </a:extLst>
+          </p:cNvPr>
+          <p:cNvSpPr/>
+          <p:nvPr/>
+        </p:nvSpPr>
+        <p:spPr>
+          <a:xfrm>
+            <a:off x="8871214" y="2409196"/>
+            <a:ext cx="357623" cy="1184586"/>
+          </a:xfrm>
+          <a:prstGeom prst="rect">
+            <a:avLst/>
+          </a:prstGeom>
+          <a:solidFill>
+            <a:schemeClr val="bg1"/>
+          </a:solidFill>
+        </p:spPr>
+        <p:style>
+          <a:lnRef idx="3">
+            <a:schemeClr val="lt1"/>
+          </a:lnRef>
+          <a:fillRef idx="1">
+            <a:schemeClr val="accent1"/>
+          </a:fillRef>
+          <a:effectRef idx="1">
+            <a:schemeClr val="accent1"/>
+          </a:effectRef>
+          <a:fontRef idx="minor">
+            <a:schemeClr val="lt1"/>
+          </a:fontRef>
+        </p:style>
+        <p:txBody>
+          <a:bodyPr rtlCol="0" anchor="ctr"/>
+          <a:lstStyle/>
+          <a:p>
+            <a:pPr algn="ctr"/>
+            <a:endParaRPr kumimoji="1" lang="zh-CN" altLang="en-US" sz="1600"/>
+          </a:p>
+        </p:txBody>
+      </p:sp>
+      <p:sp>
+        <p:nvSpPr>
+          <p:cNvPr id="33" name="右箭头 32">
+            <a:extLst>
+              <a:ext uri="{FF2B5EF4-FFF2-40B4-BE49-F238E27FC236}">
+                <a16:creationId xmlns:a16="http://schemas.microsoft.com/office/drawing/2014/main" id="{47451B99-58EF-D292-0003-797EFB06876D}"/>
+              </a:ext>
+            </a:extLst>
+          </p:cNvPr>
+          <p:cNvSpPr/>
+          <p:nvPr/>
+        </p:nvSpPr>
+        <p:spPr>
+          <a:xfrm>
+            <a:off x="8966631" y="3069601"/>
+            <a:ext cx="367809" cy="236502"/>
+          </a:xfrm>
+          <a:prstGeom prst="rightArrow">
+            <a:avLst/>
+          </a:prstGeom>
+          <a:solidFill>
+            <a:schemeClr val="accent2">
+              <a:lumMod val="60000"/>
+              <a:lumOff val="40000"/>
+            </a:schemeClr>
+          </a:solidFill>
+        </p:spPr>
+        <p:style>
+          <a:lnRef idx="2">
+            <a:schemeClr val="accent1">
+              <a:shade val="15000"/>
+            </a:schemeClr>
+          </a:lnRef>
+          <a:fillRef idx="1">
+            <a:schemeClr val="accent1"/>
+          </a:fillRef>
+          <a:effectRef idx="0">
+            <a:schemeClr val="accent1"/>
+          </a:effectRef>
+          <a:fontRef idx="minor">
+            <a:schemeClr val="lt1"/>
+          </a:fontRef>
+        </p:style>
+        <p:txBody>
+          <a:bodyPr rtlCol="0" anchor="ctr"/>
+          <a:lstStyle/>
+          <a:p>
+            <a:pPr algn="ctr"/>
+            <a:endParaRPr kumimoji="1" lang="zh-CN" altLang="en-US" sz="1600" dirty="0"/>
+          </a:p>
+        </p:txBody>
+      </p:sp>
+      <p:sp>
+        <p:nvSpPr>
+          <p:cNvPr id="2" name="圆角矩形 13">
+            <a:extLst>
+              <a:ext uri="{FF2B5EF4-FFF2-40B4-BE49-F238E27FC236}">
+                <a16:creationId xmlns:a16="http://schemas.microsoft.com/office/drawing/2014/main" id="{D77272C4-C7F3-362F-5C4B-90A06E5FE0F7}"/>
+              </a:ext>
+            </a:extLst>
+          </p:cNvPr>
+          <p:cNvSpPr/>
+          <p:nvPr/>
+        </p:nvSpPr>
+        <p:spPr>
+          <a:xfrm>
+            <a:off x="9382811" y="2643992"/>
+            <a:ext cx="995672" cy="727678"/>
+          </a:xfrm>
+          <a:prstGeom prst="roundRect">
+            <a:avLst/>
+          </a:prstGeom>
+          <a:solidFill>
+            <a:schemeClr val="accent1">
+              <a:lumMod val="60000"/>
+              <a:lumOff val="40000"/>
+            </a:schemeClr>
+          </a:solidFill>
+          <a:ln>
+            <a:solidFill>
+              <a:schemeClr val="accent1">
+                <a:lumMod val="40000"/>
+                <a:lumOff val="60000"/>
+              </a:schemeClr>
+            </a:solidFill>
+          </a:ln>
+        </p:spPr>
+        <p:style>
+          <a:lnRef idx="2">
+            <a:schemeClr val="accent1">
+              <a:shade val="15000"/>
+            </a:schemeClr>
+          </a:lnRef>
+          <a:fillRef idx="1">
+            <a:schemeClr val="accent1"/>
+          </a:fillRef>
+          <a:effectRef idx="0">
+            <a:schemeClr val="accent1"/>
+          </a:effectRef>
+          <a:fontRef idx="minor">
+            <a:schemeClr val="lt1"/>
+          </a:fontRef>
+        </p:style>
+        <p:txBody>
+          <a:bodyPr rtlCol="0" anchor="ctr"/>
+          <a:lstStyle/>
+          <a:p>
+            <a:pPr algn="ctr"/>
+            <a:r>
+              <a:rPr kumimoji="1" lang="en-US" altLang="zh-CN" sz="1400" dirty="0"/>
+              <a:t>Output</a:t>
+            </a:r>
+          </a:p>
+          <a:p>
+            <a:pPr algn="ctr"/>
+            <a:r>
+              <a:rPr kumimoji="1" lang="en-US" altLang="zh-CN" sz="1400" dirty="0"/>
+              <a:t>Register</a:t>
+            </a:r>
+            <a:endParaRPr kumimoji="1" lang="zh-CN" altLang="en-US" sz="1400" dirty="0"/>
+          </a:p>
+        </p:txBody>
+      </p:sp>
+      <p:sp>
+        <p:nvSpPr>
+          <p:cNvPr id="3" name="右箭头 32">
+            <a:extLst>
+              <a:ext uri="{FF2B5EF4-FFF2-40B4-BE49-F238E27FC236}">
+                <a16:creationId xmlns:a16="http://schemas.microsoft.com/office/drawing/2014/main" id="{D459AEC6-0D03-DFC8-92B1-B35D75D44356}"/>
+              </a:ext>
+            </a:extLst>
+          </p:cNvPr>
+          <p:cNvSpPr/>
+          <p:nvPr/>
+        </p:nvSpPr>
+        <p:spPr>
+          <a:xfrm>
+            <a:off x="10500679" y="2900482"/>
+            <a:ext cx="367809" cy="236502"/>
+          </a:xfrm>
+          <a:prstGeom prst="rightArrow">
+            <a:avLst/>
+          </a:prstGeom>
+          <a:solidFill>
+            <a:schemeClr val="accent2">
+              <a:lumMod val="60000"/>
+              <a:lumOff val="40000"/>
+            </a:schemeClr>
+          </a:solidFill>
+        </p:spPr>
+        <p:style>
+          <a:lnRef idx="2">
+            <a:schemeClr val="accent1">
+              <a:shade val="15000"/>
+            </a:schemeClr>
+          </a:lnRef>
+          <a:fillRef idx="1">
+            <a:schemeClr val="accent1"/>
+          </a:fillRef>
+          <a:effectRef idx="0">
+            <a:schemeClr val="accent1"/>
+          </a:effectRef>
+          <a:fontRef idx="minor">
+            <a:schemeClr val="lt1"/>
+          </a:fontRef>
+        </p:style>
+        <p:txBody>
+          <a:bodyPr rtlCol="0" anchor="ctr"/>
+          <a:lstStyle/>
+          <a:p>
+            <a:pPr algn="ctr"/>
+            <a:endParaRPr kumimoji="1" lang="zh-CN" altLang="en-US" sz="1600" dirty="0"/>
+          </a:p>
+        </p:txBody>
+      </p:sp>
+      <p:sp>
+        <p:nvSpPr>
+          <p:cNvPr id="5" name="圆角矩形 12">
+            <a:extLst>
+              <a:ext uri="{FF2B5EF4-FFF2-40B4-BE49-F238E27FC236}">
+                <a16:creationId xmlns:a16="http://schemas.microsoft.com/office/drawing/2014/main" id="{CB76FFCB-E446-C96C-6FC0-F56EDDD3763F}"/>
+              </a:ext>
+            </a:extLst>
+          </p:cNvPr>
+          <p:cNvSpPr/>
+          <p:nvPr/>
+        </p:nvSpPr>
+        <p:spPr>
+          <a:xfrm>
+            <a:off x="6028526" y="202657"/>
+            <a:ext cx="1436334" cy="727678"/>
+          </a:xfrm>
+          <a:prstGeom prst="roundRect">
+            <a:avLst/>
+          </a:prstGeom>
+          <a:solidFill>
+            <a:schemeClr val="accent1"/>
+          </a:solidFill>
+        </p:spPr>
+        <p:style>
+          <a:lnRef idx="2">
+            <a:schemeClr val="accent1">
+              <a:shade val="15000"/>
+            </a:schemeClr>
+          </a:lnRef>
+          <a:fillRef idx="1">
+            <a:schemeClr val="accent1"/>
+          </a:fillRef>
+          <a:effectRef idx="0">
+            <a:schemeClr val="accent1"/>
+          </a:effectRef>
+          <a:fontRef idx="minor">
+            <a:schemeClr val="lt1"/>
+          </a:fontRef>
+        </p:style>
+        <p:txBody>
+          <a:bodyPr rtlCol="0" anchor="ctr"/>
+          <a:lstStyle/>
+          <a:p>
+            <a:pPr algn="ctr"/>
+            <a:r>
+              <a:rPr kumimoji="1" lang="en-US" altLang="zh-CN" sz="1600" dirty="0" err="1"/>
+              <a:t>Write_Enable</a:t>
+            </a:r>
+            <a:endParaRPr kumimoji="1" lang="en-US" altLang="zh-CN" sz="1600" dirty="0"/>
+          </a:p>
+          <a:p>
+            <a:pPr algn="ctr"/>
+            <a:r>
+              <a:rPr kumimoji="1" lang="zh-CN" altLang="en-US" sz="1600" dirty="0"/>
+              <a:t>（</a:t>
+            </a:r>
+            <a:r>
+              <a:rPr kumimoji="1" lang="en-US" altLang="zh-CN" sz="1600" dirty="0"/>
+              <a:t>Risk</a:t>
+            </a:r>
+            <a:r>
+              <a:rPr kumimoji="1" lang="zh-CN" altLang="en-US" sz="1600" dirty="0"/>
+              <a:t>）</a:t>
+            </a:r>
+            <a:endParaRPr kumimoji="1" lang="en-US" altLang="zh-CN" sz="1600" dirty="0"/>
+          </a:p>
+          <a:p>
+            <a:pPr algn="ctr"/>
+            <a:r>
+              <a:rPr kumimoji="1" lang="en-US" altLang="zh-CN" sz="1600" dirty="0"/>
+              <a:t>Register</a:t>
+            </a:r>
+            <a:endParaRPr kumimoji="1" lang="zh-CN" altLang="en-US" sz="1600" dirty="0"/>
+          </a:p>
+        </p:txBody>
+      </p:sp>
+      <p:sp>
+        <p:nvSpPr>
+          <p:cNvPr id="11" name="右箭头 26">
+            <a:extLst>
+              <a:ext uri="{FF2B5EF4-FFF2-40B4-BE49-F238E27FC236}">
+                <a16:creationId xmlns:a16="http://schemas.microsoft.com/office/drawing/2014/main" id="{BEF6784B-65F5-BE67-8CC2-F1530F260A36}"/>
+              </a:ext>
+            </a:extLst>
+          </p:cNvPr>
+          <p:cNvSpPr/>
+          <p:nvPr/>
+        </p:nvSpPr>
+        <p:spPr>
+          <a:xfrm>
+            <a:off x="4672363" y="536724"/>
+            <a:ext cx="1239993" cy="208811"/>
+          </a:xfrm>
+          <a:prstGeom prst="rightArrow">
+            <a:avLst/>
+          </a:prstGeom>
+          <a:solidFill>
+            <a:schemeClr val="accent1">
+              <a:lumMod val="60000"/>
+              <a:lumOff val="40000"/>
+            </a:schemeClr>
+          </a:solidFill>
+        </p:spPr>
+        <p:style>
+          <a:lnRef idx="2">
+            <a:schemeClr val="accent1">
+              <a:shade val="15000"/>
+            </a:schemeClr>
+          </a:lnRef>
+          <a:fillRef idx="1">
+            <a:schemeClr val="accent1"/>
+          </a:fillRef>
+          <a:effectRef idx="0">
+            <a:schemeClr val="accent1"/>
+          </a:effectRef>
+          <a:fontRef idx="minor">
+            <a:schemeClr val="lt1"/>
+          </a:fontRef>
+        </p:style>
+        <p:txBody>
+          <a:bodyPr rtlCol="0" anchor="ctr"/>
+          <a:lstStyle/>
+          <a:p>
+            <a:pPr algn="ctr"/>
+            <a:endParaRPr kumimoji="1" lang="zh-CN" altLang="en-US" sz="1600"/>
+          </a:p>
+        </p:txBody>
+      </p:sp>
+      <p:cxnSp>
+        <p:nvCxnSpPr>
+          <p:cNvPr id="36" name="Curved Connector 35">
+            <a:extLst>
+              <a:ext uri="{FF2B5EF4-FFF2-40B4-BE49-F238E27FC236}">
+                <a16:creationId xmlns:a16="http://schemas.microsoft.com/office/drawing/2014/main" id="{6F1CEE31-DEC5-638D-8E35-0D5355A6DA84}"/>
+              </a:ext>
+            </a:extLst>
+          </p:cNvPr>
+          <p:cNvCxnSpPr>
+            <a:cxnSpLocks/>
+            <a:endCxn id="40" idx="0"/>
+          </p:cNvCxnSpPr>
+          <p:nvPr/>
+        </p:nvCxnSpPr>
+        <p:spPr>
+          <a:xfrm rot="16200000" flipH="1">
+            <a:off x="4497050" y="1123109"/>
+            <a:ext cx="546422" cy="441044"/>
+          </a:xfrm>
+          <a:prstGeom prst="curvedConnector3">
+            <a:avLst/>
+          </a:prstGeom>
+          <a:ln>
+            <a:tailEnd type="triangle"/>
+          </a:ln>
+        </p:spPr>
+        <p:style>
+          <a:lnRef idx="1">
+            <a:schemeClr val="accent1"/>
+          </a:lnRef>
+          <a:fillRef idx="0">
+            <a:schemeClr val="accent1"/>
+          </a:fillRef>
+          <a:effectRef idx="0">
+            <a:schemeClr val="accent1"/>
+          </a:effectRef>
+          <a:fontRef idx="minor">
+            <a:schemeClr val="tx1"/>
+          </a:fontRef>
+        </p:style>
+      </p:cxnSp>
+      <p:sp>
+        <p:nvSpPr>
+          <p:cNvPr id="39" name="右箭头 32">
+            <a:extLst>
+              <a:ext uri="{FF2B5EF4-FFF2-40B4-BE49-F238E27FC236}">
+                <a16:creationId xmlns:a16="http://schemas.microsoft.com/office/drawing/2014/main" id="{297810E7-18A7-7889-568F-02D8C985909D}"/>
+              </a:ext>
+            </a:extLst>
+          </p:cNvPr>
+          <p:cNvSpPr/>
+          <p:nvPr/>
+        </p:nvSpPr>
+        <p:spPr>
+          <a:xfrm rot="10800000">
+            <a:off x="8953904" y="2755568"/>
+            <a:ext cx="367809" cy="236502"/>
+          </a:xfrm>
+          <a:prstGeom prst="rightArrow">
+            <a:avLst/>
+          </a:prstGeom>
+          <a:solidFill>
+            <a:schemeClr val="accent2">
+              <a:lumMod val="60000"/>
+              <a:lumOff val="40000"/>
+            </a:schemeClr>
+          </a:solidFill>
+        </p:spPr>
+        <p:style>
+          <a:lnRef idx="2">
+            <a:schemeClr val="accent1">
+              <a:shade val="15000"/>
+            </a:schemeClr>
+          </a:lnRef>
+          <a:fillRef idx="1">
+            <a:schemeClr val="accent1"/>
+          </a:fillRef>
+          <a:effectRef idx="0">
+            <a:schemeClr val="accent1"/>
+          </a:effectRef>
+          <a:fontRef idx="minor">
+            <a:schemeClr val="lt1"/>
+          </a:fontRef>
+        </p:style>
+        <p:txBody>
+          <a:bodyPr rtlCol="0" anchor="ctr"/>
+          <a:lstStyle/>
+          <a:p>
+            <a:pPr algn="ctr"/>
+            <a:endParaRPr kumimoji="1" lang="zh-CN" altLang="en-US" sz="1600" dirty="0"/>
+          </a:p>
+        </p:txBody>
+      </p:sp>
+      <p:sp>
+        <p:nvSpPr>
+          <p:cNvPr id="40" name="圆角矩形 8">
+            <a:extLst>
+              <a:ext uri="{FF2B5EF4-FFF2-40B4-BE49-F238E27FC236}">
+                <a16:creationId xmlns:a16="http://schemas.microsoft.com/office/drawing/2014/main" id="{E512ABC3-57AA-0997-4662-492283F5010E}"/>
+              </a:ext>
+            </a:extLst>
+          </p:cNvPr>
+          <p:cNvSpPr/>
+          <p:nvPr/>
+        </p:nvSpPr>
+        <p:spPr>
+          <a:xfrm>
+            <a:off x="4349681" y="1616842"/>
+            <a:ext cx="1282203" cy="525865"/>
+          </a:xfrm>
+          <a:prstGeom prst="roundRect">
+            <a:avLst/>
+          </a:prstGeom>
+          <a:solidFill>
+            <a:schemeClr val="accent1"/>
+          </a:solidFill>
+        </p:spPr>
+        <p:style>
+          <a:lnRef idx="1">
+            <a:schemeClr val="accent4"/>
+          </a:lnRef>
+          <a:fillRef idx="2">
+            <a:schemeClr val="accent4"/>
+          </a:fillRef>
+          <a:effectRef idx="1">
+            <a:schemeClr val="accent4"/>
+          </a:effectRef>
+          <a:fontRef idx="minor">
+            <a:schemeClr val="dk1"/>
+          </a:fontRef>
+        </p:style>
+        <p:txBody>
+          <a:bodyPr rtlCol="0" anchor="ctr"/>
+          <a:lstStyle/>
+          <a:p>
+            <a:pPr algn="ctr"/>
+            <a:r>
+              <a:rPr kumimoji="1" lang="en-US" altLang="zh-CN" sz="1100" dirty="0" err="1">
+                <a:solidFill>
+                  <a:schemeClr val="lt1"/>
+                </a:solidFill>
+              </a:rPr>
+              <a:t>Instruction_Delay</a:t>
+            </a:r>
+            <a:endParaRPr kumimoji="1" lang="en-US" altLang="zh-CN" sz="1100" dirty="0">
+              <a:solidFill>
+                <a:schemeClr val="lt1"/>
+              </a:solidFill>
+            </a:endParaRPr>
+          </a:p>
+          <a:p>
+            <a:pPr algn="ctr"/>
+            <a:r>
+              <a:rPr kumimoji="1" lang="en-US" altLang="zh-CN" sz="1100" dirty="0">
+                <a:solidFill>
+                  <a:schemeClr val="lt1"/>
+                </a:solidFill>
+              </a:rPr>
+              <a:t>Register</a:t>
+            </a:r>
+            <a:endParaRPr kumimoji="1" lang="zh-CN" altLang="en-US" sz="1100" dirty="0">
+              <a:solidFill>
+                <a:schemeClr val="lt1"/>
+              </a:solidFill>
+            </a:endParaRPr>
+          </a:p>
+        </p:txBody>
+      </p:sp>
+      <p:sp>
+        <p:nvSpPr>
+          <p:cNvPr id="45" name="圆角矩形 59">
+            <a:extLst>
+              <a:ext uri="{FF2B5EF4-FFF2-40B4-BE49-F238E27FC236}">
+                <a16:creationId xmlns:a16="http://schemas.microsoft.com/office/drawing/2014/main" id="{EF7C7A67-DCCB-65F7-ECC7-70614BAEA874}"/>
+              </a:ext>
+            </a:extLst>
+          </p:cNvPr>
+          <p:cNvSpPr/>
+          <p:nvPr/>
+        </p:nvSpPr>
+        <p:spPr>
+          <a:xfrm>
+            <a:off x="642907" y="5662962"/>
+            <a:ext cx="1281662" cy="520386"/>
+          </a:xfrm>
+          <a:prstGeom prst="roundRect">
+            <a:avLst/>
+          </a:prstGeom>
+          <a:solidFill>
+            <a:schemeClr val="accent1">
+              <a:lumMod val="40000"/>
+              <a:lumOff val="60000"/>
+            </a:schemeClr>
+          </a:solidFill>
+        </p:spPr>
+        <p:style>
+          <a:lnRef idx="2">
+            <a:schemeClr val="accent1">
+              <a:shade val="15000"/>
+            </a:schemeClr>
+          </a:lnRef>
+          <a:fillRef idx="1">
+            <a:schemeClr val="accent1"/>
+          </a:fillRef>
+          <a:effectRef idx="0">
+            <a:schemeClr val="accent1"/>
+          </a:effectRef>
+          <a:fontRef idx="minor">
+            <a:schemeClr val="lt1"/>
+          </a:fontRef>
+        </p:style>
+        <p:txBody>
+          <a:bodyPr rtlCol="0" anchor="ctr"/>
+          <a:lstStyle/>
+          <a:p>
+            <a:pPr algn="ctr"/>
+            <a:r>
+              <a:rPr kumimoji="1" lang="en-US" altLang="zh-CN" sz="1600" dirty="0"/>
+              <a:t>WRITEBACK</a:t>
+            </a:r>
+            <a:endParaRPr kumimoji="1" lang="zh-CN" altLang="en-US" sz="1600" dirty="0"/>
+          </a:p>
+        </p:txBody>
+      </p:sp>
+      <p:cxnSp>
+        <p:nvCxnSpPr>
+          <p:cNvPr id="18" name="Curved Connector 17">
+            <a:extLst>
+              <a:ext uri="{FF2B5EF4-FFF2-40B4-BE49-F238E27FC236}">
+                <a16:creationId xmlns:a16="http://schemas.microsoft.com/office/drawing/2014/main" id="{BCD475D5-3EEB-858C-D2E0-C17B6CF9BD70}"/>
+              </a:ext>
+            </a:extLst>
+          </p:cNvPr>
+          <p:cNvCxnSpPr>
+            <a:cxnSpLocks/>
+            <a:stCxn id="40" idx="3"/>
+            <a:endCxn id="2" idx="0"/>
+          </p:cNvCxnSpPr>
+          <p:nvPr/>
+        </p:nvCxnSpPr>
+        <p:spPr>
+          <a:xfrm>
+            <a:off x="5631884" y="1879775"/>
+            <a:ext cx="4248763" cy="764217"/>
+          </a:xfrm>
+          <a:prstGeom prst="curvedConnector2">
+            <a:avLst/>
+          </a:prstGeom>
+          <a:ln>
+            <a:tailEnd type="triangle"/>
+          </a:ln>
+        </p:spPr>
+        <p:style>
+          <a:lnRef idx="1">
+            <a:schemeClr val="accent1"/>
+          </a:lnRef>
+          <a:fillRef idx="0">
+            <a:schemeClr val="accent1"/>
+          </a:fillRef>
+          <a:effectRef idx="0">
+            <a:schemeClr val="accent1"/>
+          </a:effectRef>
+          <a:fontRef idx="minor">
+            <a:schemeClr val="tx1"/>
+          </a:fontRef>
+        </p:style>
+      </p:cxnSp>
+      <p:cxnSp>
+        <p:nvCxnSpPr>
+          <p:cNvPr id="35" name="Curved Connector 34">
+            <a:extLst>
+              <a:ext uri="{FF2B5EF4-FFF2-40B4-BE49-F238E27FC236}">
+                <a16:creationId xmlns:a16="http://schemas.microsoft.com/office/drawing/2014/main" id="{41B4E2AC-B31E-3CE6-05C3-0BA3F1E8F503}"/>
+              </a:ext>
+            </a:extLst>
+          </p:cNvPr>
+          <p:cNvCxnSpPr>
+            <a:cxnSpLocks/>
+          </p:cNvCxnSpPr>
+          <p:nvPr/>
+        </p:nvCxnSpPr>
+        <p:spPr>
+          <a:xfrm rot="16200000" flipH="1">
+            <a:off x="7401678" y="1004920"/>
+            <a:ext cx="1854063" cy="1704892"/>
+          </a:xfrm>
+          <a:prstGeom prst="curvedConnector3">
+            <a:avLst/>
+          </a:prstGeom>
+          <a:ln>
+            <a:tailEnd type="triangle"/>
+          </a:ln>
+        </p:spPr>
+        <p:style>
+          <a:lnRef idx="1">
+            <a:schemeClr val="accent1"/>
+          </a:lnRef>
+          <a:fillRef idx="0">
+            <a:schemeClr val="accent1"/>
+          </a:fillRef>
+          <a:effectRef idx="0">
+            <a:schemeClr val="accent1"/>
+          </a:effectRef>
+          <a:fontRef idx="minor">
+            <a:schemeClr val="tx1"/>
+          </a:fontRef>
+        </p:style>
+      </p:cxnSp>
+      <p:sp>
+        <p:nvSpPr>
+          <p:cNvPr id="17" name="TextBox 16">
+            <a:extLst>
+              <a:ext uri="{FF2B5EF4-FFF2-40B4-BE49-F238E27FC236}">
+                <a16:creationId xmlns:a16="http://schemas.microsoft.com/office/drawing/2014/main" id="{7C7D82B1-F5BF-2D54-824D-55D914BAE024}"/>
+              </a:ext>
+            </a:extLst>
+          </p:cNvPr>
+          <p:cNvSpPr txBox="1"/>
+          <p:nvPr/>
+        </p:nvSpPr>
+        <p:spPr>
+          <a:xfrm>
+            <a:off x="2285096" y="5604269"/>
+            <a:ext cx="9841156" cy="923330"/>
+          </a:xfrm>
+          <a:prstGeom prst="rect">
+            <a:avLst/>
+          </a:prstGeom>
+          <a:noFill/>
+        </p:spPr>
+        <p:txBody>
+          <a:bodyPr wrap="none" rtlCol="0">
+            <a:spAutoFit/>
+          </a:bodyPr>
+          <a:lstStyle/>
+          <a:p>
+            <a:r>
+              <a:rPr lang="en-CN" dirty="0"/>
+              <a:t>现方案</a:t>
+            </a:r>
+          </a:p>
+          <a:p>
+            <a:r>
+              <a:rPr lang="en-CN" dirty="0"/>
+              <a:t>备注</a:t>
+            </a:r>
+            <a:r>
+              <a:rPr lang="zh-CN" altLang="en-US" dirty="0"/>
+              <a:t>：</a:t>
+            </a:r>
+            <a:r>
+              <a:rPr lang="en-US" altLang="zh-CN" dirty="0"/>
+              <a:t>ctrl</a:t>
+            </a:r>
+            <a:r>
+              <a:rPr lang="zh-CN" altLang="en-US" dirty="0"/>
+              <a:t>除了指挥将</a:t>
+            </a:r>
+            <a:r>
+              <a:rPr lang="en-US" altLang="zh-CN" dirty="0"/>
+              <a:t>B</a:t>
+            </a:r>
+            <a:r>
+              <a:rPr lang="zh-CN" altLang="en-US" dirty="0"/>
+              <a:t>寄存器数值写入</a:t>
+            </a:r>
+            <a:r>
+              <a:rPr lang="en-US" altLang="zh-CN" dirty="0"/>
+              <a:t>PC</a:t>
+            </a:r>
+            <a:r>
+              <a:rPr lang="zh-CN" altLang="en-US" dirty="0"/>
+              <a:t>以外，还会清空</a:t>
+            </a:r>
+            <a:r>
+              <a:rPr lang="en-US" altLang="zh-CN" dirty="0"/>
+              <a:t>Instruction</a:t>
+            </a:r>
+            <a:r>
+              <a:rPr lang="zh-CN" altLang="en-US" dirty="0"/>
+              <a:t>、</a:t>
+            </a:r>
+            <a:r>
+              <a:rPr lang="en-US" altLang="zh-CN" dirty="0"/>
+              <a:t>Cond</a:t>
+            </a:r>
+            <a:r>
+              <a:rPr lang="zh-CN" altLang="en-US" dirty="0"/>
+              <a:t>、</a:t>
+            </a:r>
+            <a:r>
+              <a:rPr lang="en-US" altLang="zh-CN" dirty="0" err="1"/>
+              <a:t>InstructionDelay</a:t>
+            </a:r>
+            <a:r>
+              <a:rPr lang="zh-CN" altLang="en-US" dirty="0"/>
+              <a:t>、</a:t>
+            </a:r>
+            <a:endParaRPr lang="en-US" altLang="zh-CN" dirty="0"/>
+          </a:p>
+          <a:p>
+            <a:r>
+              <a:rPr lang="en-US" altLang="zh-CN" dirty="0" err="1"/>
+              <a:t>WriteEnable</a:t>
+            </a:r>
+            <a:r>
+              <a:rPr lang="zh-CN" altLang="en-US" dirty="0"/>
+              <a:t>寄存器，即清空流水线。</a:t>
+            </a:r>
+            <a:endParaRPr lang="en-CN" dirty="0"/>
+          </a:p>
+        </p:txBody>
+      </p:sp>
+    </p:spTree>
+    <p:extLst>
+      <p:ext uri="{BB962C8B-B14F-4D97-AF65-F5344CB8AC3E}">
+        <p14:creationId xmlns:p14="http://schemas.microsoft.com/office/powerpoint/2010/main" val="3592926566"/>
+      </p:ext>
+    </p:extLst>
+  </p:cSld>
+  <p:clrMapOvr>
+    <a:masterClrMapping/>
+  </p:clrMapOvr>
+</p:sld>
+</file>
+
+<file path=ppt/slides/slide4.xml><?xml version="1.0" encoding="utf-8"?>
+<p:sld xmlns:a="http://schemas.openxmlformats.org/drawingml/2006/main" xmlns:r="http://schemas.openxmlformats.org/officeDocument/2006/relationships" xmlns:p="http://schemas.openxmlformats.org/presentationml/2006/main">
+  <p:cSld>
+    <p:spTree>
+      <p:nvGrpSpPr>
+        <p:cNvPr id="1" name=""/>
+        <p:cNvGrpSpPr/>
+        <p:nvPr/>
+      </p:nvGrpSpPr>
+      <p:grpSpPr>
+        <a:xfrm>
+          <a:off x="0" y="0"/>
+          <a:ext cx="0" cy="0"/>
+          <a:chOff x="0" y="0"/>
+          <a:chExt cx="0" cy="0"/>
+        </a:xfrm>
+      </p:grpSpPr>
+      <p:graphicFrame>
+        <p:nvGraphicFramePr>
+          <p:cNvPr id="2" name="Table 1">
+            <a:extLst>
+              <a:ext uri="{FF2B5EF4-FFF2-40B4-BE49-F238E27FC236}">
+                <a16:creationId xmlns:a16="http://schemas.microsoft.com/office/drawing/2014/main" id="{B032C1A4-F1B0-E5E5-7E55-6D76DFC27D2C}"/>
+              </a:ext>
+            </a:extLst>
+          </p:cNvPr>
+          <p:cNvGraphicFramePr>
+            <a:graphicFrameLocks noGrp="1"/>
+          </p:cNvGraphicFramePr>
+          <p:nvPr>
+            <p:extLst>
+              <p:ext uri="{D42A27DB-BD31-4B8C-83A1-F6EECF244321}">
+                <p14:modId xmlns:p14="http://schemas.microsoft.com/office/powerpoint/2010/main" val="3147077657"/>
+              </p:ext>
+            </p:extLst>
+          </p:nvPr>
+        </p:nvGraphicFramePr>
+        <p:xfrm>
+          <a:off x="1842812" y="630620"/>
+          <a:ext cx="3475422" cy="1478280"/>
+        </p:xfrm>
+        <a:graphic>
+          <a:graphicData uri="http://schemas.openxmlformats.org/drawingml/2006/table">
+            <a:tbl>
+              <a:tblPr firstRow="1" bandRow="1">
+                <a:tableStyleId>{5C22544A-7EE6-4342-B048-85BDC9FD1C3A}</a:tableStyleId>
+              </a:tblPr>
+              <a:tblGrid>
+                <a:gridCol w="1325906">
+                  <a:extLst>
+                    <a:ext uri="{9D8B030D-6E8A-4147-A177-3AD203B41FA5}">
+                      <a16:colId xmlns:a16="http://schemas.microsoft.com/office/drawing/2014/main" val="2459382653"/>
+                    </a:ext>
+                  </a:extLst>
+                </a:gridCol>
+                <a:gridCol w="991042">
+                  <a:extLst>
+                    <a:ext uri="{9D8B030D-6E8A-4147-A177-3AD203B41FA5}">
+                      <a16:colId xmlns:a16="http://schemas.microsoft.com/office/drawing/2014/main" val="1042919707"/>
+                    </a:ext>
+                  </a:extLst>
+                </a:gridCol>
+                <a:gridCol w="1158474">
+                  <a:extLst>
+                    <a:ext uri="{9D8B030D-6E8A-4147-A177-3AD203B41FA5}">
+                      <a16:colId xmlns:a16="http://schemas.microsoft.com/office/drawing/2014/main" val="4188676412"/>
+                    </a:ext>
+                  </a:extLst>
+                </a:gridCol>
+              </a:tblGrid>
+              <a:tr h="270699">
+                <a:tc>
+                  <a:txBody>
+                    <a:bodyPr/>
+                    <a:lstStyle/>
+                    <a:p>
+                      <a:pPr algn="ctr"/>
+                      <a:r>
+                        <a:rPr lang="en-CN" dirty="0"/>
+                        <a:t>ACTIVATE</a:t>
+                      </a:r>
+                    </a:p>
+                  </a:txBody>
+                  <a:tcPr/>
+                </a:tc>
+                <a:tc>
+                  <a:txBody>
+                    <a:bodyPr/>
+                    <a:lstStyle/>
+                    <a:p>
+                      <a:pPr algn="ctr"/>
+                      <a:r>
+                        <a:rPr lang="en-CN" dirty="0"/>
+                        <a:t>CS</a:t>
+                      </a:r>
+                    </a:p>
+                  </a:txBody>
+                  <a:tcPr/>
+                </a:tc>
+                <a:tc>
+                  <a:txBody>
+                    <a:bodyPr/>
+                    <a:lstStyle/>
+                    <a:p>
+                      <a:pPr algn="ctr"/>
+                      <a:r>
+                        <a:rPr lang="en-CN" dirty="0"/>
+                        <a:t>BTA</a:t>
+                      </a:r>
+                    </a:p>
+                  </a:txBody>
+                  <a:tcPr/>
+                </a:tc>
+                <a:extLst>
+                  <a:ext uri="{0D108BD9-81ED-4DB2-BD59-A6C34878D82A}">
+                    <a16:rowId xmlns:a16="http://schemas.microsoft.com/office/drawing/2014/main" val="2396642285"/>
+                  </a:ext>
+                </a:extLst>
+              </a:tr>
+              <a:tr h="370840">
+                <a:tc>
+                  <a:txBody>
+                    <a:bodyPr/>
+                    <a:lstStyle/>
+                    <a:p>
+                      <a:pPr algn="ctr"/>
+                      <a:r>
+                        <a:rPr lang="en-US" altLang="zh-CN" dirty="0"/>
+                        <a:t>0</a:t>
+                      </a:r>
+                      <a:endParaRPr lang="en-CN" dirty="0"/>
+                    </a:p>
+                  </a:txBody>
+                  <a:tcPr/>
+                </a:tc>
+                <a:tc>
+                  <a:txBody>
+                    <a:bodyPr/>
+                    <a:lstStyle/>
+                    <a:p>
+                      <a:pPr algn="ctr"/>
+                      <a:r>
+                        <a:rPr lang="en-US" altLang="zh-CN" dirty="0"/>
+                        <a:t>11</a:t>
+                      </a:r>
+                      <a:endParaRPr lang="en-CN" dirty="0"/>
+                    </a:p>
+                  </a:txBody>
+                  <a:tcPr/>
+                </a:tc>
+                <a:tc>
+                  <a:txBody>
+                    <a:bodyPr/>
+                    <a:lstStyle/>
+                    <a:p>
+                      <a:pPr algn="ctr"/>
+                      <a:r>
+                        <a:rPr lang="en-US" altLang="zh-CN" dirty="0"/>
+                        <a:t>00000000</a:t>
+                      </a:r>
+                      <a:endParaRPr lang="en-CN" dirty="0"/>
+                    </a:p>
+                  </a:txBody>
+                  <a:tcPr/>
+                </a:tc>
+                <a:extLst>
+                  <a:ext uri="{0D108BD9-81ED-4DB2-BD59-A6C34878D82A}">
+                    <a16:rowId xmlns:a16="http://schemas.microsoft.com/office/drawing/2014/main" val="751872452"/>
+                  </a:ext>
+                </a:extLst>
+              </a:tr>
+              <a:tr h="370840">
+                <a:tc>
+                  <a:txBody>
+                    <a:bodyPr/>
+                    <a:lstStyle/>
+                    <a:p>
+                      <a:pPr algn="ctr"/>
+                      <a:r>
+                        <a:rPr lang="en-US" altLang="zh-CN" dirty="0"/>
+                        <a:t>1</a:t>
+                      </a:r>
+                      <a:endParaRPr lang="en-CN" dirty="0"/>
+                    </a:p>
+                  </a:txBody>
+                  <a:tcPr/>
+                </a:tc>
+                <a:tc>
+                  <a:txBody>
+                    <a:bodyPr/>
+                    <a:lstStyle/>
+                    <a:p>
+                      <a:pPr algn="ctr"/>
+                      <a:r>
+                        <a:rPr lang="en-US" altLang="zh-CN" dirty="0"/>
+                        <a:t>01</a:t>
+                      </a:r>
+                      <a:endParaRPr lang="en-CN" dirty="0"/>
+                    </a:p>
+                  </a:txBody>
+                  <a:tcPr/>
+                </a:tc>
+                <a:tc>
+                  <a:txBody>
+                    <a:bodyPr/>
+                    <a:lstStyle/>
+                    <a:p>
+                      <a:pPr algn="ctr"/>
+                      <a:r>
+                        <a:rPr lang="en-US" altLang="zh-CN" dirty="0"/>
+                        <a:t>01010011</a:t>
+                      </a:r>
+                      <a:endParaRPr lang="en-CN" dirty="0"/>
+                    </a:p>
+                  </a:txBody>
+                  <a:tcPr/>
+                </a:tc>
+                <a:extLst>
+                  <a:ext uri="{0D108BD9-81ED-4DB2-BD59-A6C34878D82A}">
+                    <a16:rowId xmlns:a16="http://schemas.microsoft.com/office/drawing/2014/main" val="3503078896"/>
+                  </a:ext>
+                </a:extLst>
+              </a:tr>
+              <a:tr h="370840">
+                <a:tc>
+                  <a:txBody>
+                    <a:bodyPr/>
+                    <a:lstStyle/>
+                    <a:p>
+                      <a:endParaRPr lang="en-CN"/>
+                    </a:p>
+                  </a:txBody>
+                  <a:tcPr/>
+                </a:tc>
+                <a:tc>
+                  <a:txBody>
+                    <a:bodyPr/>
+                    <a:lstStyle/>
+                    <a:p>
+                      <a:endParaRPr lang="en-CN"/>
+                    </a:p>
+                  </a:txBody>
+                  <a:tcPr/>
+                </a:tc>
+                <a:tc>
+                  <a:txBody>
+                    <a:bodyPr/>
+                    <a:lstStyle/>
+                    <a:p>
+                      <a:endParaRPr lang="en-CN" dirty="0"/>
+                    </a:p>
+                  </a:txBody>
+                  <a:tcPr/>
+                </a:tc>
+                <a:extLst>
+                  <a:ext uri="{0D108BD9-81ED-4DB2-BD59-A6C34878D82A}">
+                    <a16:rowId xmlns:a16="http://schemas.microsoft.com/office/drawing/2014/main" val="1586949569"/>
+                  </a:ext>
+                </a:extLst>
+              </a:tr>
+            </a:tbl>
+          </a:graphicData>
+        </a:graphic>
+      </p:graphicFrame>
+      <p:sp>
+        <p:nvSpPr>
+          <p:cNvPr id="3" name="TextBox 2">
+            <a:extLst>
+              <a:ext uri="{FF2B5EF4-FFF2-40B4-BE49-F238E27FC236}">
+                <a16:creationId xmlns:a16="http://schemas.microsoft.com/office/drawing/2014/main" id="{F3D3F098-6A62-1F52-90D7-A835F50D058B}"/>
+              </a:ext>
+            </a:extLst>
+          </p:cNvPr>
+          <p:cNvSpPr txBox="1"/>
+          <p:nvPr/>
+        </p:nvSpPr>
+        <p:spPr>
+          <a:xfrm>
+            <a:off x="2617387" y="261288"/>
+            <a:ext cx="1747594" cy="369332"/>
+          </a:xfrm>
+          <a:prstGeom prst="rect">
+            <a:avLst/>
+          </a:prstGeom>
+          <a:noFill/>
+        </p:spPr>
+        <p:txBody>
+          <a:bodyPr wrap="none" rtlCol="0">
+            <a:spAutoFit/>
+          </a:bodyPr>
+          <a:lstStyle/>
+          <a:p>
+            <a:r>
+              <a:rPr lang="en-CN" dirty="0"/>
+              <a:t>分支历史表BHT</a:t>
+            </a:r>
+          </a:p>
+        </p:txBody>
+      </p:sp>
+      <p:sp>
+        <p:nvSpPr>
+          <p:cNvPr id="4" name="TextBox 3">
+            <a:extLst>
+              <a:ext uri="{FF2B5EF4-FFF2-40B4-BE49-F238E27FC236}">
+                <a16:creationId xmlns:a16="http://schemas.microsoft.com/office/drawing/2014/main" id="{DA72BEDF-530B-F66F-1F57-BEA9836C920D}"/>
+              </a:ext>
+            </a:extLst>
+          </p:cNvPr>
+          <p:cNvSpPr txBox="1"/>
+          <p:nvPr/>
+        </p:nvSpPr>
+        <p:spPr>
+          <a:xfrm>
+            <a:off x="248427" y="630620"/>
+            <a:ext cx="1779654" cy="369332"/>
+          </a:xfrm>
+          <a:prstGeom prst="rect">
+            <a:avLst/>
+          </a:prstGeom>
+          <a:noFill/>
+        </p:spPr>
+        <p:txBody>
+          <a:bodyPr wrap="none" rtlCol="0">
+            <a:spAutoFit/>
+          </a:bodyPr>
+          <a:lstStyle/>
+          <a:p>
+            <a:r>
+              <a:rPr lang="en-CN" dirty="0"/>
+              <a:t>BIA</a:t>
+            </a:r>
+            <a:r>
+              <a:rPr lang="zh-CN" altLang="en-US" dirty="0"/>
+              <a:t>（</a:t>
+            </a:r>
+            <a:r>
+              <a:rPr lang="en-US" altLang="zh-CN" dirty="0"/>
+              <a:t>Address</a:t>
+            </a:r>
+            <a:r>
+              <a:rPr lang="zh-CN" altLang="en-US" dirty="0"/>
+              <a:t>）</a:t>
+            </a:r>
+            <a:endParaRPr lang="en-US" altLang="zh-CN" dirty="0"/>
+          </a:p>
+        </p:txBody>
+      </p:sp>
+      <p:sp>
+        <p:nvSpPr>
+          <p:cNvPr id="5" name="TextBox 4">
+            <a:extLst>
+              <a:ext uri="{FF2B5EF4-FFF2-40B4-BE49-F238E27FC236}">
+                <a16:creationId xmlns:a16="http://schemas.microsoft.com/office/drawing/2014/main" id="{4074D1EE-6E90-9692-39CB-4054EF567AAF}"/>
+              </a:ext>
+            </a:extLst>
+          </p:cNvPr>
+          <p:cNvSpPr txBox="1"/>
+          <p:nvPr/>
+        </p:nvSpPr>
+        <p:spPr>
+          <a:xfrm>
+            <a:off x="7830207" y="445954"/>
+            <a:ext cx="4280339" cy="3139321"/>
+          </a:xfrm>
+          <a:prstGeom prst="rect">
+            <a:avLst/>
+          </a:prstGeom>
+          <a:noFill/>
+        </p:spPr>
+        <p:txBody>
+          <a:bodyPr wrap="none" rtlCol="0">
+            <a:spAutoFit/>
+          </a:bodyPr>
+          <a:lstStyle/>
+          <a:p>
+            <a:r>
+              <a:rPr lang="en-CN" dirty="0"/>
+              <a:t>BIA</a:t>
+            </a:r>
+            <a:r>
+              <a:rPr lang="zh-CN" altLang="en-US" dirty="0"/>
+              <a:t>：分支指令地址</a:t>
+            </a:r>
+            <a:endParaRPr lang="en-US" altLang="zh-CN" dirty="0"/>
+          </a:p>
+          <a:p>
+            <a:r>
+              <a:rPr lang="en-US" altLang="zh-CN" dirty="0"/>
+              <a:t>BTA</a:t>
+            </a:r>
+            <a:r>
+              <a:rPr lang="zh-CN" altLang="en-US" dirty="0"/>
+              <a:t>：分支目标地址</a:t>
+            </a:r>
+            <a:endParaRPr lang="en-US" altLang="zh-CN" dirty="0"/>
+          </a:p>
+          <a:p>
+            <a:r>
+              <a:rPr lang="en-US" altLang="zh-CN" dirty="0"/>
+              <a:t>CS</a:t>
+            </a:r>
+            <a:r>
+              <a:rPr lang="zh-CN" altLang="en-US" dirty="0"/>
+              <a:t>：</a:t>
+            </a:r>
+            <a:r>
+              <a:rPr lang="en-US" altLang="zh-CN" dirty="0"/>
+              <a:t>2</a:t>
+            </a:r>
+            <a:r>
+              <a:rPr lang="zh-CN" altLang="en-US" dirty="0"/>
+              <a:t>位预测当前状态</a:t>
+            </a:r>
+            <a:endParaRPr lang="en-US" altLang="zh-CN" dirty="0"/>
+          </a:p>
+          <a:p>
+            <a:r>
+              <a:rPr lang="en-US" altLang="zh-CN" dirty="0"/>
+              <a:t>ACTIVATE</a:t>
+            </a:r>
+            <a:r>
+              <a:rPr lang="zh-CN" altLang="en-US" dirty="0"/>
+              <a:t>：该</a:t>
+            </a:r>
+            <a:r>
+              <a:rPr lang="en-US" altLang="zh-CN" dirty="0"/>
+              <a:t>BIA</a:t>
+            </a:r>
+            <a:r>
+              <a:rPr lang="zh-CN" altLang="en-US" dirty="0"/>
+              <a:t>是否被激活为分支指令</a:t>
+            </a:r>
+            <a:endParaRPr lang="en-US" altLang="zh-CN" dirty="0"/>
+          </a:p>
+          <a:p>
+            <a:endParaRPr lang="en-US" altLang="zh-CN" dirty="0"/>
+          </a:p>
+          <a:p>
+            <a:r>
+              <a:rPr lang="en-US" altLang="zh-CN" dirty="0"/>
+              <a:t>BIA</a:t>
+            </a:r>
+            <a:r>
+              <a:rPr lang="zh-CN" altLang="en-US" dirty="0"/>
+              <a:t>与分支历史表地址绑定，</a:t>
+            </a:r>
+            <a:endParaRPr lang="en-US" altLang="zh-CN" dirty="0"/>
+          </a:p>
+          <a:p>
+            <a:r>
+              <a:rPr lang="en-US" altLang="zh-CN" dirty="0"/>
+              <a:t>Activate</a:t>
+            </a:r>
+            <a:r>
+              <a:rPr lang="zh-CN" altLang="en-US" dirty="0"/>
+              <a:t>说明该地址是否是分支指令，</a:t>
+            </a:r>
+            <a:endParaRPr lang="en-US" altLang="zh-CN" dirty="0"/>
+          </a:p>
+          <a:p>
+            <a:r>
+              <a:rPr lang="en-US" altLang="zh-CN" dirty="0"/>
+              <a:t>CS</a:t>
+            </a:r>
+            <a:r>
+              <a:rPr lang="zh-CN" altLang="en-US" dirty="0"/>
+              <a:t>由如下图的</a:t>
+            </a:r>
+            <a:r>
+              <a:rPr lang="en-US" altLang="zh-CN" dirty="0"/>
+              <a:t>FSM</a:t>
+            </a:r>
+            <a:r>
+              <a:rPr lang="zh-CN" altLang="en-CN" dirty="0"/>
+              <a:t>状态机</a:t>
+            </a:r>
+            <a:r>
+              <a:rPr lang="zh-CN" altLang="en-US" dirty="0"/>
+              <a:t>控制，当其</a:t>
+            </a:r>
+            <a:endParaRPr lang="en-US" altLang="zh-CN" dirty="0"/>
+          </a:p>
+          <a:p>
+            <a:r>
+              <a:rPr lang="zh-CN" altLang="en-US" dirty="0"/>
+              <a:t>高位为</a:t>
+            </a:r>
+            <a:r>
+              <a:rPr lang="en-US" altLang="zh-CN" dirty="0"/>
+              <a:t>1</a:t>
+            </a:r>
+            <a:r>
+              <a:rPr lang="zh-CN" altLang="en-US" dirty="0"/>
+              <a:t>时执行跳转，跳转的目标是</a:t>
+            </a:r>
+            <a:endParaRPr lang="en-US" altLang="zh-CN" dirty="0"/>
+          </a:p>
+          <a:p>
+            <a:r>
+              <a:rPr lang="en-US" altLang="zh-CN" dirty="0"/>
+              <a:t>BTA</a:t>
+            </a:r>
+            <a:r>
+              <a:rPr lang="zh-CN" altLang="en-US" dirty="0"/>
+              <a:t>。</a:t>
+            </a:r>
+            <a:endParaRPr lang="en-US" altLang="zh-CN" dirty="0"/>
+          </a:p>
+          <a:p>
+            <a:endParaRPr lang="en-CN" dirty="0"/>
+          </a:p>
+        </p:txBody>
+      </p:sp>
+      <p:pic>
+        <p:nvPicPr>
+          <p:cNvPr id="6" name="Picture 5">
+            <a:extLst>
+              <a:ext uri="{FF2B5EF4-FFF2-40B4-BE49-F238E27FC236}">
+                <a16:creationId xmlns:a16="http://schemas.microsoft.com/office/drawing/2014/main" id="{1BA935AF-9058-EDE9-30EF-EDD1DAE0C882}"/>
+              </a:ext>
+            </a:extLst>
+          </p:cNvPr>
+          <p:cNvPicPr>
+            <a:picLocks noChangeAspect="1"/>
+          </p:cNvPicPr>
+          <p:nvPr/>
+        </p:nvPicPr>
+        <p:blipFill>
+          <a:blip r:embed="rId2"/>
+          <a:stretch>
+            <a:fillRect/>
+          </a:stretch>
+        </p:blipFill>
+        <p:spPr>
+          <a:xfrm>
+            <a:off x="2028081" y="2650301"/>
+            <a:ext cx="2771783" cy="3788104"/>
+          </a:xfrm>
+          <a:prstGeom prst="rect">
+            <a:avLst/>
+          </a:prstGeom>
+        </p:spPr>
+      </p:pic>
+      <p:sp>
+        <p:nvSpPr>
+          <p:cNvPr id="7" name="TextBox 6">
+            <a:extLst>
+              <a:ext uri="{FF2B5EF4-FFF2-40B4-BE49-F238E27FC236}">
+                <a16:creationId xmlns:a16="http://schemas.microsoft.com/office/drawing/2014/main" id="{70BEF648-18B5-AD39-B95A-FDF6303DE780}"/>
+              </a:ext>
+            </a:extLst>
+          </p:cNvPr>
+          <p:cNvSpPr txBox="1"/>
+          <p:nvPr/>
+        </p:nvSpPr>
+        <p:spPr>
+          <a:xfrm>
+            <a:off x="2276477" y="3670738"/>
+            <a:ext cx="428322" cy="369332"/>
+          </a:xfrm>
+          <a:prstGeom prst="rect">
+            <a:avLst/>
+          </a:prstGeom>
+          <a:noFill/>
+        </p:spPr>
+        <p:txBody>
+          <a:bodyPr wrap="none" rtlCol="0">
+            <a:spAutoFit/>
+          </a:bodyPr>
+          <a:lstStyle/>
+          <a:p>
+            <a:r>
+              <a:rPr lang="en-US" altLang="zh-CN" dirty="0"/>
+              <a:t>11</a:t>
+            </a:r>
+            <a:endParaRPr lang="en-CN" dirty="0"/>
+          </a:p>
+        </p:txBody>
+      </p:sp>
+      <p:sp>
+        <p:nvSpPr>
+          <p:cNvPr id="8" name="TextBox 7">
+            <a:extLst>
+              <a:ext uri="{FF2B5EF4-FFF2-40B4-BE49-F238E27FC236}">
+                <a16:creationId xmlns:a16="http://schemas.microsoft.com/office/drawing/2014/main" id="{970D93C3-1216-1E47-1452-5E49234C0EE0}"/>
+              </a:ext>
+            </a:extLst>
+          </p:cNvPr>
+          <p:cNvSpPr txBox="1"/>
+          <p:nvPr/>
+        </p:nvSpPr>
+        <p:spPr>
+          <a:xfrm>
+            <a:off x="4596065" y="3670738"/>
+            <a:ext cx="428322" cy="369332"/>
+          </a:xfrm>
+          <a:prstGeom prst="rect">
+            <a:avLst/>
+          </a:prstGeom>
+          <a:noFill/>
+        </p:spPr>
+        <p:txBody>
+          <a:bodyPr wrap="none" rtlCol="0">
+            <a:spAutoFit/>
+          </a:bodyPr>
+          <a:lstStyle/>
+          <a:p>
+            <a:r>
+              <a:rPr lang="en-US" altLang="zh-CN" dirty="0"/>
+              <a:t>10</a:t>
+            </a:r>
+            <a:endParaRPr lang="en-CN" dirty="0"/>
+          </a:p>
+        </p:txBody>
+      </p:sp>
+      <p:sp>
+        <p:nvSpPr>
+          <p:cNvPr id="9" name="TextBox 8">
+            <a:extLst>
+              <a:ext uri="{FF2B5EF4-FFF2-40B4-BE49-F238E27FC236}">
+                <a16:creationId xmlns:a16="http://schemas.microsoft.com/office/drawing/2014/main" id="{67ED9B6F-850A-0766-095E-2088D60257AA}"/>
+              </a:ext>
+            </a:extLst>
+          </p:cNvPr>
+          <p:cNvSpPr txBox="1"/>
+          <p:nvPr/>
+        </p:nvSpPr>
+        <p:spPr>
+          <a:xfrm>
+            <a:off x="2276477" y="5481092"/>
+            <a:ext cx="428322" cy="369332"/>
+          </a:xfrm>
+          <a:prstGeom prst="rect">
+            <a:avLst/>
+          </a:prstGeom>
+          <a:noFill/>
+        </p:spPr>
+        <p:txBody>
+          <a:bodyPr wrap="none" rtlCol="0">
+            <a:spAutoFit/>
+          </a:bodyPr>
+          <a:lstStyle/>
+          <a:p>
+            <a:r>
+              <a:rPr lang="en-US" altLang="zh-CN" dirty="0"/>
+              <a:t>01</a:t>
+            </a:r>
+            <a:endParaRPr lang="en-CN" dirty="0"/>
+          </a:p>
+        </p:txBody>
+      </p:sp>
+      <p:sp>
+        <p:nvSpPr>
+          <p:cNvPr id="10" name="TextBox 9">
+            <a:extLst>
+              <a:ext uri="{FF2B5EF4-FFF2-40B4-BE49-F238E27FC236}">
+                <a16:creationId xmlns:a16="http://schemas.microsoft.com/office/drawing/2014/main" id="{D12446DD-4DA9-FCD2-3C6F-A5DADA243247}"/>
+              </a:ext>
+            </a:extLst>
+          </p:cNvPr>
+          <p:cNvSpPr txBox="1"/>
+          <p:nvPr/>
+        </p:nvSpPr>
+        <p:spPr>
+          <a:xfrm>
+            <a:off x="4683301" y="4994872"/>
+            <a:ext cx="428322" cy="369332"/>
+          </a:xfrm>
+          <a:prstGeom prst="rect">
+            <a:avLst/>
+          </a:prstGeom>
+          <a:noFill/>
+        </p:spPr>
+        <p:txBody>
+          <a:bodyPr wrap="none" rtlCol="0">
+            <a:spAutoFit/>
+          </a:bodyPr>
+          <a:lstStyle/>
+          <a:p>
+            <a:r>
+              <a:rPr lang="en-US" altLang="zh-CN" dirty="0"/>
+              <a:t>00</a:t>
+            </a:r>
+            <a:endParaRPr lang="en-CN" dirty="0"/>
+          </a:p>
+        </p:txBody>
+      </p:sp>
+      <p:sp>
+        <p:nvSpPr>
+          <p:cNvPr id="12" name="TextBox 11">
+            <a:extLst>
+              <a:ext uri="{FF2B5EF4-FFF2-40B4-BE49-F238E27FC236}">
+                <a16:creationId xmlns:a16="http://schemas.microsoft.com/office/drawing/2014/main" id="{B6418748-E119-E641-D0C1-8E8760B6F12E}"/>
+              </a:ext>
+            </a:extLst>
+          </p:cNvPr>
+          <p:cNvSpPr txBox="1"/>
+          <p:nvPr/>
+        </p:nvSpPr>
+        <p:spPr>
+          <a:xfrm>
+            <a:off x="558608" y="999952"/>
+            <a:ext cx="1159292" cy="646331"/>
+          </a:xfrm>
+          <a:prstGeom prst="rect">
+            <a:avLst/>
+          </a:prstGeom>
+          <a:noFill/>
+        </p:spPr>
+        <p:txBody>
+          <a:bodyPr wrap="none" rtlCol="0">
+            <a:spAutoFit/>
+          </a:bodyPr>
+          <a:lstStyle/>
+          <a:p>
+            <a:r>
+              <a:rPr lang="en-US" altLang="zh-CN" dirty="0"/>
+              <a:t>00000000</a:t>
+            </a:r>
+          </a:p>
+          <a:p>
+            <a:endParaRPr lang="en-CN" dirty="0"/>
+          </a:p>
+        </p:txBody>
+      </p:sp>
+      <p:sp>
+        <p:nvSpPr>
+          <p:cNvPr id="13" name="TextBox 12">
+            <a:extLst>
+              <a:ext uri="{FF2B5EF4-FFF2-40B4-BE49-F238E27FC236}">
+                <a16:creationId xmlns:a16="http://schemas.microsoft.com/office/drawing/2014/main" id="{E9642F65-A205-F0E1-A699-12DC8BD942FE}"/>
+              </a:ext>
+            </a:extLst>
+          </p:cNvPr>
+          <p:cNvSpPr txBox="1"/>
+          <p:nvPr/>
+        </p:nvSpPr>
+        <p:spPr>
+          <a:xfrm>
+            <a:off x="558608" y="1369284"/>
+            <a:ext cx="1159292" cy="646331"/>
+          </a:xfrm>
+          <a:prstGeom prst="rect">
+            <a:avLst/>
+          </a:prstGeom>
+          <a:noFill/>
+        </p:spPr>
+        <p:txBody>
+          <a:bodyPr wrap="none" rtlCol="0">
+            <a:spAutoFit/>
+          </a:bodyPr>
+          <a:lstStyle/>
+          <a:p>
+            <a:r>
+              <a:rPr lang="en-US" altLang="zh-CN" dirty="0"/>
+              <a:t>00000001</a:t>
+            </a:r>
+            <a:endParaRPr lang="en-CN" dirty="0"/>
+          </a:p>
+          <a:p>
+            <a:endParaRPr lang="en-CN" dirty="0"/>
+          </a:p>
+        </p:txBody>
+      </p:sp>
+      <p:sp>
+        <p:nvSpPr>
+          <p:cNvPr id="14" name="TextBox 13">
+            <a:extLst>
+              <a:ext uri="{FF2B5EF4-FFF2-40B4-BE49-F238E27FC236}">
+                <a16:creationId xmlns:a16="http://schemas.microsoft.com/office/drawing/2014/main" id="{7A306144-872A-0670-94CD-9E14FA9F7015}"/>
+              </a:ext>
+            </a:extLst>
+          </p:cNvPr>
+          <p:cNvSpPr txBox="1"/>
+          <p:nvPr/>
+        </p:nvSpPr>
+        <p:spPr>
+          <a:xfrm>
+            <a:off x="884017" y="1739568"/>
+            <a:ext cx="508473" cy="369332"/>
+          </a:xfrm>
+          <a:prstGeom prst="rect">
+            <a:avLst/>
+          </a:prstGeom>
+          <a:noFill/>
+        </p:spPr>
+        <p:txBody>
+          <a:bodyPr wrap="none" rtlCol="0">
+            <a:spAutoFit/>
+          </a:bodyPr>
+          <a:lstStyle/>
+          <a:p>
+            <a:r>
+              <a:rPr lang="en-US" dirty="0"/>
+              <a:t>……</a:t>
+            </a:r>
+            <a:endParaRPr lang="en-CN" dirty="0"/>
+          </a:p>
+        </p:txBody>
+      </p:sp>
+    </p:spTree>
+    <p:extLst>
+      <p:ext uri="{BB962C8B-B14F-4D97-AF65-F5344CB8AC3E}">
+        <p14:creationId xmlns:p14="http://schemas.microsoft.com/office/powerpoint/2010/main" val="2004947384"/>
       </p:ext>
     </p:extLst>
   </p:cSld>

</xml_diff>